<commit_message>
Testing github checkin permission
</commit_message>
<xml_diff>
--- a/Deliverable1/Docs/TopicPresentation.pptx
+++ b/Deliverable1/Docs/TopicPresentation.pptx
@@ -35,6 +35,15 @@
   </p:sldIdLst>
   <p:sldSz cx="9144000" cy="6858000" type="screen4x3"/>
   <p:notesSz cx="6858000" cy="9144000"/>
+  <p:embeddedFontLst>
+    <p:embeddedFont>
+      <p:font typeface="Calibri" panose="020F0502020204030204" pitchFamily="34" charset="0"/>
+      <p:regular r:id="rId27"/>
+      <p:bold r:id="rId28"/>
+      <p:italic r:id="rId29"/>
+      <p:boldItalic r:id="rId30"/>
+    </p:embeddedFont>
+  </p:embeddedFontLst>
   <p:defaultTextStyle>
     <a:defPPr marR="0" lvl="0" algn="l" rtl="0">
       <a:lnSpc>
@@ -239,7 +248,7 @@
   </p:defaultTextStyle>
   <p:extLst>
     <p:ext uri="{EFAFB233-063F-42B5-8137-9DF3F51BA10A}">
-      <p15:sldGuideLst xmlns="" xmlns:p15="http://schemas.microsoft.com/office/powerpoint/2012/main">
+      <p15:sldGuideLst xmlns:p15="http://schemas.microsoft.com/office/powerpoint/2012/main">
         <p15:guide id="1" orient="horz" pos="2160">
           <p15:clr>
             <a:srgbClr val="A4A3A4"/>
@@ -19860,13 +19869,13 @@
   <p:clrMapOvr>
     <a:masterClrMapping/>
   </p:clrMapOvr>
-  <p:transition xmlns:p14="http://schemas.microsoft.com/office/powerpoint/2010/main" spd="slow">
+  <p:transition spd="slow">
     <p:cut/>
   </p:transition>
   <p:timing>
     <p:tnLst>
       <p:par>
-        <p:cTn xmlns:p14="http://schemas.microsoft.com/office/powerpoint/2010/main" id="1" dur="indefinite" restart="never" nodeType="tmRoot"/>
+        <p:cTn id="1" dur="indefinite" restart="never" nodeType="tmRoot"/>
       </p:par>
     </p:tnLst>
   </p:timing>
@@ -20200,7 +20209,7 @@
   <p:clrMapOvr>
     <a:masterClrMapping/>
   </p:clrMapOvr>
-  <p:transition xmlns:p14="http://schemas.microsoft.com/office/powerpoint/2010/main" spd="slow">
+  <p:transition spd="slow">
     <p:cut/>
   </p:transition>
 </p:sld>
@@ -20684,7 +20693,7 @@
   <p:clrMapOvr>
     <a:masterClrMapping/>
   </p:clrMapOvr>
-  <p:transition xmlns:p14="http://schemas.microsoft.com/office/powerpoint/2010/main" spd="slow">
+  <p:transition spd="slow">
     <p:cut/>
   </p:transition>
 </p:sld>
@@ -21156,7 +21165,7 @@
   <p:clrMapOvr>
     <a:masterClrMapping/>
   </p:clrMapOvr>
-  <p:transition xmlns:p14="http://schemas.microsoft.com/office/powerpoint/2010/main" spd="slow">
+  <p:transition spd="slow">
     <p:cut/>
   </p:transition>
 </p:sld>
@@ -21454,7 +21463,7 @@
   <p:clrMapOvr>
     <a:masterClrMapping/>
   </p:clrMapOvr>
-  <p:transition xmlns:p14="http://schemas.microsoft.com/office/powerpoint/2010/main" spd="slow">
+  <p:transition spd="slow">
     <p:cut/>
   </p:transition>
 </p:sld>
@@ -21729,7 +21738,7 @@
   <p:clrMapOvr>
     <a:masterClrMapping/>
   </p:clrMapOvr>
-  <p:transition xmlns:p14="http://schemas.microsoft.com/office/powerpoint/2010/main" spd="slow">
+  <p:transition spd="slow">
     <p:cut/>
   </p:transition>
 </p:sld>
@@ -22262,7 +22271,7 @@
   <p:clrMapOvr>
     <a:masterClrMapping/>
   </p:clrMapOvr>
-  <p:transition xmlns:p14="http://schemas.microsoft.com/office/powerpoint/2010/main" spd="slow">
+  <p:transition spd="slow">
     <p:cut/>
   </p:transition>
 </p:sld>
@@ -22568,7 +22577,7 @@
   <p:clrMapOvr>
     <a:masterClrMapping/>
   </p:clrMapOvr>
-  <p:transition xmlns:p14="http://schemas.microsoft.com/office/powerpoint/2010/main" spd="slow">
+  <p:transition spd="slow">
     <p:cut/>
   </p:transition>
 </p:sld>
@@ -22878,7 +22887,7 @@
   <p:clrMapOvr>
     <a:masterClrMapping/>
   </p:clrMapOvr>
-  <p:transition xmlns:p14="http://schemas.microsoft.com/office/powerpoint/2010/main" spd="slow">
+  <p:transition spd="slow">
     <p:cut/>
   </p:transition>
 </p:sld>
@@ -23100,7 +23109,7 @@
   <p:clrMapOvr>
     <a:masterClrMapping/>
   </p:clrMapOvr>
-  <p:transition xmlns:p14="http://schemas.microsoft.com/office/powerpoint/2010/main" spd="slow">
+  <p:transition spd="slow">
     <p:cut/>
   </p:transition>
 </p:sld>
@@ -23636,7 +23645,7 @@
   <p:clrMapOvr>
     <a:masterClrMapping/>
   </p:clrMapOvr>
-  <p:transition xmlns:p14="http://schemas.microsoft.com/office/powerpoint/2010/main" spd="slow">
+  <p:transition spd="slow">
     <p:cut/>
   </p:transition>
 </p:sld>
@@ -24076,7 +24085,7 @@
   <p:clrMapOvr>
     <a:masterClrMapping/>
   </p:clrMapOvr>
-  <p:transition xmlns:p14="http://schemas.microsoft.com/office/powerpoint/2010/main" spd="slow">
+  <p:transition spd="slow">
     <p:cut/>
   </p:transition>
 </p:sld>
@@ -24349,7 +24358,7 @@
   <p:clrMapOvr>
     <a:masterClrMapping/>
   </p:clrMapOvr>
-  <p:transition xmlns:p14="http://schemas.microsoft.com/office/powerpoint/2010/main" spd="slow">
+  <p:transition spd="slow">
     <p:cut/>
   </p:transition>
 </p:sld>
@@ -24741,7 +24750,7 @@
   <p:clrMapOvr>
     <a:masterClrMapping/>
   </p:clrMapOvr>
-  <p:transition xmlns:p14="http://schemas.microsoft.com/office/powerpoint/2010/main" spd="slow">
+  <p:transition spd="slow">
     <p:cut/>
   </p:transition>
 </p:sld>
@@ -25191,7 +25200,7 @@
   <p:clrMapOvr>
     <a:masterClrMapping/>
   </p:clrMapOvr>
-  <p:transition xmlns:p14="http://schemas.microsoft.com/office/powerpoint/2010/main" spd="slow">
+  <p:transition spd="slow">
     <p:cut/>
   </p:transition>
 </p:sld>
@@ -25226,8 +25235,8 @@
         </p:nvSpPr>
         <p:spPr>
           <a:xfrm>
-            <a:off x="0" y="999067"/>
-            <a:ext cx="9143998" cy="5164664"/>
+            <a:off x="0" y="991351"/>
+            <a:ext cx="9143998" cy="5172380"/>
           </a:xfrm>
           <a:prstGeom prst="rect">
             <a:avLst/>
@@ -25527,7 +25536,7 @@
   <p:clrMapOvr>
     <a:masterClrMapping/>
   </p:clrMapOvr>
-  <p:transition xmlns:p14="http://schemas.microsoft.com/office/powerpoint/2010/main" spd="slow">
+  <p:transition spd="slow">
     <p:cut/>
   </p:transition>
 </p:sld>
@@ -25898,7 +25907,7 @@
   <p:clrMapOvr>
     <a:masterClrMapping/>
   </p:clrMapOvr>
-  <p:transition xmlns:p14="http://schemas.microsoft.com/office/powerpoint/2010/main" spd="slow">
+  <p:transition spd="slow">
     <p:cut/>
   </p:transition>
 </p:sld>
@@ -26236,7 +26245,7 @@
   <p:clrMapOvr>
     <a:masterClrMapping/>
   </p:clrMapOvr>
-  <p:transition xmlns:p14="http://schemas.microsoft.com/office/powerpoint/2010/main" spd="slow">
+  <p:transition spd="slow">
     <p:cut/>
   </p:transition>
 </p:sld>

</xml_diff>

<commit_message>
Updated Slides based on feedback
</commit_message>
<xml_diff>
--- a/Deliverable1/Docs/TopicPresentation.pptx
+++ b/Deliverable1/Docs/TopicPresentation.pptx
@@ -11,37 +11,38 @@
     <p:sldMasterId id="2147483669" r:id="rId7"/>
   </p:sldMasterIdLst>
   <p:notesMasterIdLst>
-    <p:notesMasterId r:id="rId26"/>
+    <p:notesMasterId r:id="rId27"/>
   </p:notesMasterIdLst>
   <p:sldIdLst>
     <p:sldId id="256" r:id="rId8"/>
     <p:sldId id="257" r:id="rId9"/>
     <p:sldId id="258" r:id="rId10"/>
-    <p:sldId id="274" r:id="rId11"/>
-    <p:sldId id="259" r:id="rId12"/>
-    <p:sldId id="260" r:id="rId13"/>
-    <p:sldId id="261" r:id="rId14"/>
-    <p:sldId id="270" r:id="rId15"/>
-    <p:sldId id="275" r:id="rId16"/>
-    <p:sldId id="276" r:id="rId17"/>
-    <p:sldId id="272" r:id="rId18"/>
-    <p:sldId id="262" r:id="rId19"/>
-    <p:sldId id="263" r:id="rId20"/>
-    <p:sldId id="273" r:id="rId21"/>
-    <p:sldId id="265" r:id="rId22"/>
-    <p:sldId id="266" r:id="rId23"/>
-    <p:sldId id="267" r:id="rId24"/>
-    <p:sldId id="268" r:id="rId25"/>
+    <p:sldId id="277" r:id="rId11"/>
+    <p:sldId id="274" r:id="rId12"/>
+    <p:sldId id="259" r:id="rId13"/>
+    <p:sldId id="260" r:id="rId14"/>
+    <p:sldId id="261" r:id="rId15"/>
+    <p:sldId id="270" r:id="rId16"/>
+    <p:sldId id="275" r:id="rId17"/>
+    <p:sldId id="276" r:id="rId18"/>
+    <p:sldId id="272" r:id="rId19"/>
+    <p:sldId id="262" r:id="rId20"/>
+    <p:sldId id="263" r:id="rId21"/>
+    <p:sldId id="273" r:id="rId22"/>
+    <p:sldId id="265" r:id="rId23"/>
+    <p:sldId id="266" r:id="rId24"/>
+    <p:sldId id="267" r:id="rId25"/>
+    <p:sldId id="268" r:id="rId26"/>
   </p:sldIdLst>
   <p:sldSz cx="9144000" cy="6858000" type="screen4x3"/>
   <p:notesSz cx="6858000" cy="9144000"/>
   <p:embeddedFontLst>
     <p:embeddedFont>
       <p:font typeface="Calibri" panose="020F0502020204030204" pitchFamily="34" charset="0"/>
-      <p:regular r:id="rId27"/>
-      <p:bold r:id="rId28"/>
-      <p:italic r:id="rId29"/>
-      <p:boldItalic r:id="rId30"/>
+      <p:regular r:id="rId28"/>
+      <p:bold r:id="rId29"/>
+      <p:italic r:id="rId30"/>
+      <p:boldItalic r:id="rId31"/>
     </p:embeddedFont>
   </p:embeddedFontLst>
   <p:defaultTextStyle>
@@ -847,6 +848,116 @@
     </p:spTree>
     <p:extLst>
       <p:ext uri="{BB962C8B-B14F-4D97-AF65-F5344CB8AC3E}">
+        <p14:creationId xmlns:p14="http://schemas.microsoft.com/office/powerpoint/2010/main" val="1777483670"/>
+      </p:ext>
+    </p:extLst>
+  </p:cSld>
+  <p:clrMapOvr>
+    <a:masterClrMapping/>
+  </p:clrMapOvr>
+</p:notes>
+</file>
+
+<file path=ppt/notesSlides/notesSlide12.xml><?xml version="1.0" encoding="utf-8"?>
+<p:notes xmlns:a="http://schemas.openxmlformats.org/drawingml/2006/main" xmlns:r="http://schemas.openxmlformats.org/officeDocument/2006/relationships" xmlns:p="http://schemas.openxmlformats.org/presentationml/2006/main" showMasterSp="0" showMasterPhAnim="0">
+  <p:cSld>
+    <p:spTree>
+      <p:nvGrpSpPr>
+        <p:cNvPr id="1" name="Shape 140"/>
+        <p:cNvGrpSpPr/>
+        <p:nvPr/>
+      </p:nvGrpSpPr>
+      <p:grpSpPr>
+        <a:xfrm>
+          <a:off x="0" y="0"/>
+          <a:ext cx="0" cy="0"/>
+          <a:chOff x="0" y="0"/>
+          <a:chExt cx="0" cy="0"/>
+        </a:xfrm>
+      </p:grpSpPr>
+      <p:sp>
+        <p:nvSpPr>
+          <p:cNvPr id="141" name="Shape 141"/>
+          <p:cNvSpPr txBox="1">
+            <a:spLocks noGrp="1"/>
+          </p:cNvSpPr>
+          <p:nvPr>
+            <p:ph type="body" idx="1"/>
+          </p:nvPr>
+        </p:nvSpPr>
+        <p:spPr>
+          <a:xfrm>
+            <a:off x="685800" y="4343400"/>
+            <a:ext cx="5486399" cy="4114800"/>
+          </a:xfrm>
+          <a:prstGeom prst="rect">
+            <a:avLst/>
+          </a:prstGeom>
+          <a:noFill/>
+          <a:ln>
+            <a:noFill/>
+          </a:ln>
+        </p:spPr>
+        <p:txBody>
+          <a:bodyPr lIns="91425" tIns="91425" rIns="91425" bIns="91425" anchor="ctr" anchorCtr="0">
+            <a:noAutofit/>
+          </a:bodyPr>
+          <a:lstStyle/>
+          <a:p>
+            <a:pPr lvl="0">
+              <a:spcBef>
+                <a:spcPts val="0"/>
+              </a:spcBef>
+              <a:buNone/>
+            </a:pPr>
+            <a:endParaRPr dirty="0"/>
+          </a:p>
+        </p:txBody>
+      </p:sp>
+      <p:sp>
+        <p:nvSpPr>
+          <p:cNvPr id="142" name="Shape 142"/>
+          <p:cNvSpPr>
+            <a:spLocks noGrp="1" noRot="1" noChangeAspect="1"/>
+          </p:cNvSpPr>
+          <p:nvPr>
+            <p:ph type="sldImg" idx="2"/>
+          </p:nvPr>
+        </p:nvSpPr>
+        <p:spPr>
+          <a:xfrm>
+            <a:off x="1143000" y="685800"/>
+            <a:ext cx="4572000" cy="3429000"/>
+          </a:xfrm>
+          <a:custGeom>
+            <a:avLst/>
+            <a:gdLst/>
+            <a:ahLst/>
+            <a:cxnLst/>
+            <a:rect l="0" t="0" r="0" b="0"/>
+            <a:pathLst>
+              <a:path w="120000" h="120000" extrusionOk="0">
+                <a:moveTo>
+                  <a:pt x="0" y="0"/>
+                </a:moveTo>
+                <a:lnTo>
+                  <a:pt x="120000" y="0"/>
+                </a:lnTo>
+                <a:lnTo>
+                  <a:pt x="120000" y="120000"/>
+                </a:lnTo>
+                <a:lnTo>
+                  <a:pt x="0" y="120000"/>
+                </a:lnTo>
+                <a:close/>
+              </a:path>
+            </a:pathLst>
+          </a:custGeom>
+        </p:spPr>
+      </p:sp>
+    </p:spTree>
+    <p:extLst>
+      <p:ext uri="{BB962C8B-B14F-4D97-AF65-F5344CB8AC3E}">
         <p14:creationId xmlns:p14="http://schemas.microsoft.com/office/powerpoint/2010/main" val="3259809174"/>
       </p:ext>
     </p:extLst>
@@ -857,7 +968,7 @@
 </p:notes>
 </file>
 
-<file path=ppt/notesSlides/notesSlide12.xml><?xml version="1.0" encoding="utf-8"?>
+<file path=ppt/notesSlides/notesSlide13.xml><?xml version="1.0" encoding="utf-8"?>
 <p:notes xmlns:a="http://schemas.openxmlformats.org/drawingml/2006/main" xmlns:r="http://schemas.openxmlformats.org/officeDocument/2006/relationships" xmlns:p="http://schemas.openxmlformats.org/presentationml/2006/main" showMasterSp="0" showMasterPhAnim="0">
   <p:cSld>
     <p:spTree>
@@ -967,7 +1078,7 @@
 </p:notes>
 </file>
 
-<file path=ppt/notesSlides/notesSlide13.xml><?xml version="1.0" encoding="utf-8"?>
+<file path=ppt/notesSlides/notesSlide14.xml><?xml version="1.0" encoding="utf-8"?>
 <p:notes xmlns:a="http://schemas.openxmlformats.org/drawingml/2006/main" xmlns:r="http://schemas.openxmlformats.org/officeDocument/2006/relationships" xmlns:p="http://schemas.openxmlformats.org/presentationml/2006/main" showMasterSp="0" showMasterPhAnim="0">
   <p:cSld>
     <p:spTree>
@@ -1077,7 +1188,7 @@
 </p:notes>
 </file>
 
-<file path=ppt/notesSlides/notesSlide14.xml><?xml version="1.0" encoding="utf-8"?>
+<file path=ppt/notesSlides/notesSlide15.xml><?xml version="1.0" encoding="utf-8"?>
 <p:notes xmlns:a="http://schemas.openxmlformats.org/drawingml/2006/main" xmlns:r="http://schemas.openxmlformats.org/officeDocument/2006/relationships" xmlns:p="http://schemas.openxmlformats.org/presentationml/2006/main" showMasterSp="0" showMasterPhAnim="0">
   <p:cSld>
     <p:spTree>
@@ -1187,7 +1298,7 @@
 </p:notes>
 </file>
 
-<file path=ppt/notesSlides/notesSlide15.xml><?xml version="1.0" encoding="utf-8"?>
+<file path=ppt/notesSlides/notesSlide16.xml><?xml version="1.0" encoding="utf-8"?>
 <p:notes xmlns:a="http://schemas.openxmlformats.org/drawingml/2006/main" xmlns:r="http://schemas.openxmlformats.org/officeDocument/2006/relationships" xmlns:p="http://schemas.openxmlformats.org/presentationml/2006/main" showMasterSp="0" showMasterPhAnim="0">
   <p:cSld>
     <p:spTree>
@@ -1297,7 +1408,7 @@
 </p:notes>
 </file>
 
-<file path=ppt/notesSlides/notesSlide16.xml><?xml version="1.0" encoding="utf-8"?>
+<file path=ppt/notesSlides/notesSlide17.xml><?xml version="1.0" encoding="utf-8"?>
 <p:notes xmlns:a="http://schemas.openxmlformats.org/drawingml/2006/main" xmlns:r="http://schemas.openxmlformats.org/officeDocument/2006/relationships" xmlns:p="http://schemas.openxmlformats.org/presentationml/2006/main" showMasterSp="0" showMasterPhAnim="0">
   <p:cSld>
     <p:spTree>
@@ -1407,7 +1518,7 @@
 </p:notes>
 </file>
 
-<file path=ppt/notesSlides/notesSlide17.xml><?xml version="1.0" encoding="utf-8"?>
+<file path=ppt/notesSlides/notesSlide18.xml><?xml version="1.0" encoding="utf-8"?>
 <p:notes xmlns:a="http://schemas.openxmlformats.org/drawingml/2006/main" xmlns:r="http://schemas.openxmlformats.org/officeDocument/2006/relationships" xmlns:p="http://schemas.openxmlformats.org/presentationml/2006/main" showMasterSp="0" showMasterPhAnim="0">
   <p:cSld>
     <p:spTree>
@@ -1517,7 +1628,7 @@
 </p:notes>
 </file>
 
-<file path=ppt/notesSlides/notesSlide18.xml><?xml version="1.0" encoding="utf-8"?>
+<file path=ppt/notesSlides/notesSlide19.xml><?xml version="1.0" encoding="utf-8"?>
 <p:notes xmlns:a="http://schemas.openxmlformats.org/drawingml/2006/main" xmlns:r="http://schemas.openxmlformats.org/officeDocument/2006/relationships" xmlns:p="http://schemas.openxmlformats.org/presentationml/2006/main" showMasterSp="0" showMasterPhAnim="0">
   <p:cSld>
     <p:spTree>
@@ -1852,6 +1963,116 @@
   <p:cSld>
     <p:spTree>
       <p:nvGrpSpPr>
+        <p:cNvPr id="1" name="Shape 122"/>
+        <p:cNvGrpSpPr/>
+        <p:nvPr/>
+      </p:nvGrpSpPr>
+      <p:grpSpPr>
+        <a:xfrm>
+          <a:off x="0" y="0"/>
+          <a:ext cx="0" cy="0"/>
+          <a:chOff x="0" y="0"/>
+          <a:chExt cx="0" cy="0"/>
+        </a:xfrm>
+      </p:grpSpPr>
+      <p:sp>
+        <p:nvSpPr>
+          <p:cNvPr id="123" name="Shape 123"/>
+          <p:cNvSpPr txBox="1">
+            <a:spLocks noGrp="1"/>
+          </p:cNvSpPr>
+          <p:nvPr>
+            <p:ph type="body" idx="1"/>
+          </p:nvPr>
+        </p:nvSpPr>
+        <p:spPr>
+          <a:xfrm>
+            <a:off x="685800" y="4343400"/>
+            <a:ext cx="5486399" cy="4114800"/>
+          </a:xfrm>
+          <a:prstGeom prst="rect">
+            <a:avLst/>
+          </a:prstGeom>
+          <a:noFill/>
+          <a:ln>
+            <a:noFill/>
+          </a:ln>
+        </p:spPr>
+        <p:txBody>
+          <a:bodyPr lIns="91425" tIns="91425" rIns="91425" bIns="91425" anchor="ctr" anchorCtr="0">
+            <a:noAutofit/>
+          </a:bodyPr>
+          <a:lstStyle/>
+          <a:p>
+            <a:pPr lvl="0">
+              <a:spcBef>
+                <a:spcPts val="0"/>
+              </a:spcBef>
+              <a:buNone/>
+            </a:pPr>
+            <a:endParaRPr dirty="0"/>
+          </a:p>
+        </p:txBody>
+      </p:sp>
+      <p:sp>
+        <p:nvSpPr>
+          <p:cNvPr id="124" name="Shape 124"/>
+          <p:cNvSpPr>
+            <a:spLocks noGrp="1" noRot="1" noChangeAspect="1"/>
+          </p:cNvSpPr>
+          <p:nvPr>
+            <p:ph type="sldImg" idx="2"/>
+          </p:nvPr>
+        </p:nvSpPr>
+        <p:spPr>
+          <a:xfrm>
+            <a:off x="1143000" y="685800"/>
+            <a:ext cx="4572000" cy="3429000"/>
+          </a:xfrm>
+          <a:custGeom>
+            <a:avLst/>
+            <a:gdLst/>
+            <a:ahLst/>
+            <a:cxnLst/>
+            <a:rect l="0" t="0" r="0" b="0"/>
+            <a:pathLst>
+              <a:path w="120000" h="120000" extrusionOk="0">
+                <a:moveTo>
+                  <a:pt x="0" y="0"/>
+                </a:moveTo>
+                <a:lnTo>
+                  <a:pt x="120000" y="0"/>
+                </a:lnTo>
+                <a:lnTo>
+                  <a:pt x="120000" y="120000"/>
+                </a:lnTo>
+                <a:lnTo>
+                  <a:pt x="0" y="120000"/>
+                </a:lnTo>
+                <a:close/>
+              </a:path>
+            </a:pathLst>
+          </a:custGeom>
+        </p:spPr>
+      </p:sp>
+    </p:spTree>
+    <p:extLst>
+      <p:ext uri="{BB962C8B-B14F-4D97-AF65-F5344CB8AC3E}">
+        <p14:creationId xmlns:p14="http://schemas.microsoft.com/office/powerpoint/2010/main" val="760192486"/>
+      </p:ext>
+    </p:extLst>
+  </p:cSld>
+  <p:clrMapOvr>
+    <a:masterClrMapping/>
+  </p:clrMapOvr>
+</p:notes>
+</file>
+
+<file path=ppt/notesSlides/notesSlide5.xml><?xml version="1.0" encoding="utf-8"?>
+<p:notes xmlns:a="http://schemas.openxmlformats.org/drawingml/2006/main" xmlns:r="http://schemas.openxmlformats.org/officeDocument/2006/relationships" xmlns:p="http://schemas.openxmlformats.org/presentationml/2006/main" showMasterSp="0" showMasterPhAnim="0">
+  <p:cSld>
+    <p:spTree>
+      <p:nvGrpSpPr>
         <p:cNvPr id="1" name="Shape 140"/>
         <p:cNvGrpSpPr/>
         <p:nvPr/>
@@ -1957,7 +2178,7 @@
 </p:notes>
 </file>
 
-<file path=ppt/notesSlides/notesSlide5.xml><?xml version="1.0" encoding="utf-8"?>
+<file path=ppt/notesSlides/notesSlide6.xml><?xml version="1.0" encoding="utf-8"?>
 <p:notes xmlns:a="http://schemas.openxmlformats.org/drawingml/2006/main" xmlns:r="http://schemas.openxmlformats.org/officeDocument/2006/relationships" xmlns:p="http://schemas.openxmlformats.org/presentationml/2006/main" showMasterSp="0" showMasterPhAnim="0">
   <p:cSld>
     <p:spTree>
@@ -2067,7 +2288,7 @@
 </p:notes>
 </file>
 
-<file path=ppt/notesSlides/notesSlide6.xml><?xml version="1.0" encoding="utf-8"?>
+<file path=ppt/notesSlides/notesSlide7.xml><?xml version="1.0" encoding="utf-8"?>
 <p:notes xmlns:a="http://schemas.openxmlformats.org/drawingml/2006/main" xmlns:r="http://schemas.openxmlformats.org/officeDocument/2006/relationships" xmlns:p="http://schemas.openxmlformats.org/presentationml/2006/main" showMasterSp="0" showMasterPhAnim="0">
   <p:cSld>
     <p:spTree>
@@ -2177,7 +2398,7 @@
 </p:notes>
 </file>
 
-<file path=ppt/notesSlides/notesSlide7.xml><?xml version="1.0" encoding="utf-8"?>
+<file path=ppt/notesSlides/notesSlide8.xml><?xml version="1.0" encoding="utf-8"?>
 <p:notes xmlns:a="http://schemas.openxmlformats.org/drawingml/2006/main" xmlns:r="http://schemas.openxmlformats.org/officeDocument/2006/relationships" xmlns:p="http://schemas.openxmlformats.org/presentationml/2006/main" showMasterSp="0" showMasterPhAnim="0">
   <p:cSld>
     <p:spTree>
@@ -2278,116 +2499,6 @@
     <p:extLst>
       <p:ext uri="{BB962C8B-B14F-4D97-AF65-F5344CB8AC3E}">
         <p14:creationId xmlns:p14="http://schemas.microsoft.com/office/powerpoint/2010/main" val="750243607"/>
-      </p:ext>
-    </p:extLst>
-  </p:cSld>
-  <p:clrMapOvr>
-    <a:masterClrMapping/>
-  </p:clrMapOvr>
-</p:notes>
-</file>
-
-<file path=ppt/notesSlides/notesSlide8.xml><?xml version="1.0" encoding="utf-8"?>
-<p:notes xmlns:a="http://schemas.openxmlformats.org/drawingml/2006/main" xmlns:r="http://schemas.openxmlformats.org/officeDocument/2006/relationships" xmlns:p="http://schemas.openxmlformats.org/presentationml/2006/main" showMasterSp="0" showMasterPhAnim="0">
-  <p:cSld>
-    <p:spTree>
-      <p:nvGrpSpPr>
-        <p:cNvPr id="1" name="Shape 140"/>
-        <p:cNvGrpSpPr/>
-        <p:nvPr/>
-      </p:nvGrpSpPr>
-      <p:grpSpPr>
-        <a:xfrm>
-          <a:off x="0" y="0"/>
-          <a:ext cx="0" cy="0"/>
-          <a:chOff x="0" y="0"/>
-          <a:chExt cx="0" cy="0"/>
-        </a:xfrm>
-      </p:grpSpPr>
-      <p:sp>
-        <p:nvSpPr>
-          <p:cNvPr id="141" name="Shape 141"/>
-          <p:cNvSpPr txBox="1">
-            <a:spLocks noGrp="1"/>
-          </p:cNvSpPr>
-          <p:nvPr>
-            <p:ph type="body" idx="1"/>
-          </p:nvPr>
-        </p:nvSpPr>
-        <p:spPr>
-          <a:xfrm>
-            <a:off x="685800" y="4343400"/>
-            <a:ext cx="5486399" cy="4114800"/>
-          </a:xfrm>
-          <a:prstGeom prst="rect">
-            <a:avLst/>
-          </a:prstGeom>
-          <a:noFill/>
-          <a:ln>
-            <a:noFill/>
-          </a:ln>
-        </p:spPr>
-        <p:txBody>
-          <a:bodyPr lIns="91425" tIns="91425" rIns="91425" bIns="91425" anchor="ctr" anchorCtr="0">
-            <a:noAutofit/>
-          </a:bodyPr>
-          <a:lstStyle/>
-          <a:p>
-            <a:pPr lvl="0">
-              <a:spcBef>
-                <a:spcPts val="0"/>
-              </a:spcBef>
-              <a:buNone/>
-            </a:pPr>
-            <a:endParaRPr dirty="0"/>
-          </a:p>
-        </p:txBody>
-      </p:sp>
-      <p:sp>
-        <p:nvSpPr>
-          <p:cNvPr id="142" name="Shape 142"/>
-          <p:cNvSpPr>
-            <a:spLocks noGrp="1" noRot="1" noChangeAspect="1"/>
-          </p:cNvSpPr>
-          <p:nvPr>
-            <p:ph type="sldImg" idx="2"/>
-          </p:nvPr>
-        </p:nvSpPr>
-        <p:spPr>
-          <a:xfrm>
-            <a:off x="1143000" y="685800"/>
-            <a:ext cx="4572000" cy="3429000"/>
-          </a:xfrm>
-          <a:custGeom>
-            <a:avLst/>
-            <a:gdLst/>
-            <a:ahLst/>
-            <a:cxnLst/>
-            <a:rect l="0" t="0" r="0" b="0"/>
-            <a:pathLst>
-              <a:path w="120000" h="120000" extrusionOk="0">
-                <a:moveTo>
-                  <a:pt x="0" y="0"/>
-                </a:moveTo>
-                <a:lnTo>
-                  <a:pt x="120000" y="0"/>
-                </a:lnTo>
-                <a:lnTo>
-                  <a:pt x="120000" y="120000"/>
-                </a:lnTo>
-                <a:lnTo>
-                  <a:pt x="0" y="120000"/>
-                </a:lnTo>
-                <a:close/>
-              </a:path>
-            </a:pathLst>
-          </a:custGeom>
-        </p:spPr>
-      </p:sp>
-    </p:spTree>
-    <p:extLst>
-      <p:ext uri="{BB962C8B-B14F-4D97-AF65-F5344CB8AC3E}">
-        <p14:creationId xmlns:p14="http://schemas.microsoft.com/office/powerpoint/2010/main" val="1777483670"/>
       </p:ext>
     </p:extLst>
   </p:cSld>
@@ -19911,6 +20022,351 @@
         </p:nvSpPr>
         <p:spPr>
           <a:xfrm>
+            <a:off x="0" y="801384"/>
+            <a:ext cx="9143998" cy="5362347"/>
+          </a:xfrm>
+          <a:prstGeom prst="rect">
+            <a:avLst/>
+          </a:prstGeom>
+          <a:noFill/>
+          <a:ln>
+            <a:noFill/>
+          </a:ln>
+        </p:spPr>
+        <p:txBody>
+          <a:bodyPr lIns="274300" tIns="45700" rIns="274300" bIns="45700" anchor="t" anchorCtr="0">
+            <a:noAutofit/>
+          </a:bodyPr>
+          <a:lstStyle/>
+          <a:p>
+            <a:pPr marL="311150" lvl="1" indent="0" algn="ctr">
+              <a:spcBef>
+                <a:spcPts val="1080"/>
+              </a:spcBef>
+              <a:spcAft>
+                <a:spcPts val="0"/>
+              </a:spcAft>
+              <a:buSzPct val="25000"/>
+              <a:buNone/>
+            </a:pPr>
+            <a:r>
+              <a:rPr lang="en-US" sz="1800" dirty="0" smtClean="0"/>
+              <a:t>Survey</a:t>
+            </a:r>
+            <a:r>
+              <a:rPr lang="en-US" sz="1800" dirty="0"/>
+              <a:t>: </a:t>
+            </a:r>
+            <a:r>
+              <a:rPr lang="en-US" sz="1800" dirty="0" smtClean="0"/>
+              <a:t>http</a:t>
+            </a:r>
+            <a:r>
+              <a:rPr lang="en-US" sz="1800" dirty="0"/>
+              <a:t>://goo.gl/forms/LLjb84tBuA </a:t>
+            </a:r>
+            <a:endParaRPr lang="en-US" sz="1800" dirty="0" smtClean="0"/>
+          </a:p>
+          <a:p>
+            <a:pPr marL="311150" lvl="1" indent="0">
+              <a:spcBef>
+                <a:spcPts val="1080"/>
+              </a:spcBef>
+              <a:spcAft>
+                <a:spcPts val="0"/>
+              </a:spcAft>
+              <a:buSzPct val="25000"/>
+              <a:buNone/>
+            </a:pPr>
+            <a:endParaRPr sz="2400" b="0" i="0" u="none" strike="noStrike" cap="none" dirty="0">
+              <a:solidFill>
+                <a:schemeClr val="lt1"/>
+              </a:solidFill>
+              <a:latin typeface="Calibri"/>
+              <a:ea typeface="Calibri"/>
+              <a:cs typeface="Calibri"/>
+              <a:sym typeface="Calibri"/>
+            </a:endParaRPr>
+          </a:p>
+          <a:p>
+            <a:pPr marL="0" marR="0" lvl="0" indent="0" algn="l" rtl="0">
+              <a:spcBef>
+                <a:spcPts val="1080"/>
+              </a:spcBef>
+              <a:spcAft>
+                <a:spcPts val="0"/>
+              </a:spcAft>
+              <a:buClr>
+                <a:schemeClr val="lt1"/>
+              </a:buClr>
+              <a:buSzPct val="25000"/>
+              <a:buFont typeface="Arial"/>
+              <a:buNone/>
+            </a:pPr>
+            <a:endParaRPr sz="2400" b="0" i="0" u="none" strike="noStrike" cap="none" dirty="0">
+              <a:solidFill>
+                <a:schemeClr val="lt1"/>
+              </a:solidFill>
+              <a:latin typeface="Calibri"/>
+              <a:ea typeface="Calibri"/>
+              <a:cs typeface="Calibri"/>
+              <a:sym typeface="Calibri"/>
+            </a:endParaRPr>
+          </a:p>
+          <a:p>
+            <a:pPr marL="0" marR="0" lvl="0" indent="0" algn="l" rtl="0">
+              <a:spcBef>
+                <a:spcPts val="1080"/>
+              </a:spcBef>
+              <a:spcAft>
+                <a:spcPts val="0"/>
+              </a:spcAft>
+              <a:buClr>
+                <a:schemeClr val="lt1"/>
+              </a:buClr>
+              <a:buSzPct val="25000"/>
+              <a:buFont typeface="Arial"/>
+              <a:buNone/>
+            </a:pPr>
+            <a:endParaRPr sz="2400" b="0" i="0" u="none" strike="noStrike" cap="none" dirty="0">
+              <a:solidFill>
+                <a:schemeClr val="lt1"/>
+              </a:solidFill>
+              <a:latin typeface="Calibri"/>
+              <a:ea typeface="Calibri"/>
+              <a:cs typeface="Calibri"/>
+              <a:sym typeface="Calibri"/>
+            </a:endParaRPr>
+          </a:p>
+          <a:p>
+            <a:pPr marL="0" marR="0" lvl="0" indent="0" algn="l" rtl="0">
+              <a:spcBef>
+                <a:spcPts val="1080"/>
+              </a:spcBef>
+              <a:spcAft>
+                <a:spcPts val="0"/>
+              </a:spcAft>
+              <a:buClr>
+                <a:schemeClr val="lt1"/>
+              </a:buClr>
+              <a:buSzPct val="25000"/>
+              <a:buFont typeface="Arial"/>
+              <a:buNone/>
+            </a:pPr>
+            <a:endParaRPr sz="2400" b="0" i="0" u="none" strike="noStrike" cap="none" dirty="0">
+              <a:solidFill>
+                <a:schemeClr val="lt1"/>
+              </a:solidFill>
+              <a:latin typeface="Calibri"/>
+              <a:ea typeface="Calibri"/>
+              <a:cs typeface="Calibri"/>
+              <a:sym typeface="Calibri"/>
+            </a:endParaRPr>
+          </a:p>
+          <a:p>
+            <a:pPr marL="0" marR="0" lvl="0" indent="0" algn="l" rtl="0">
+              <a:spcBef>
+                <a:spcPts val="1080"/>
+              </a:spcBef>
+              <a:spcAft>
+                <a:spcPts val="0"/>
+              </a:spcAft>
+              <a:buClr>
+                <a:schemeClr val="lt1"/>
+              </a:buClr>
+              <a:buSzPct val="25000"/>
+              <a:buFont typeface="Arial"/>
+              <a:buNone/>
+            </a:pPr>
+            <a:endParaRPr sz="2400" b="0" i="0" u="none" strike="noStrike" cap="none" dirty="0">
+              <a:solidFill>
+                <a:schemeClr val="lt1"/>
+              </a:solidFill>
+              <a:latin typeface="Calibri"/>
+              <a:ea typeface="Calibri"/>
+              <a:cs typeface="Calibri"/>
+              <a:sym typeface="Calibri"/>
+            </a:endParaRPr>
+          </a:p>
+          <a:p>
+            <a:pPr marL="0" marR="0" lvl="0" indent="0" algn="l" rtl="0">
+              <a:spcBef>
+                <a:spcPts val="1080"/>
+              </a:spcBef>
+              <a:spcAft>
+                <a:spcPts val="0"/>
+              </a:spcAft>
+              <a:buClr>
+                <a:schemeClr val="lt1"/>
+              </a:buClr>
+              <a:buSzPct val="25000"/>
+              <a:buFont typeface="Arial"/>
+              <a:buNone/>
+            </a:pPr>
+            <a:endParaRPr sz="2400" b="0" i="0" u="none" strike="noStrike" cap="none" dirty="0">
+              <a:solidFill>
+                <a:schemeClr val="lt1"/>
+              </a:solidFill>
+              <a:latin typeface="Calibri"/>
+              <a:ea typeface="Calibri"/>
+              <a:cs typeface="Calibri"/>
+              <a:sym typeface="Calibri"/>
+            </a:endParaRPr>
+          </a:p>
+        </p:txBody>
+      </p:sp>
+      <p:sp>
+        <p:nvSpPr>
+          <p:cNvPr id="145" name="Shape 145"/>
+          <p:cNvSpPr txBox="1">
+            <a:spLocks noGrp="1"/>
+          </p:cNvSpPr>
+          <p:nvPr>
+            <p:ph type="title"/>
+          </p:nvPr>
+        </p:nvSpPr>
+        <p:spPr>
+          <a:xfrm>
+            <a:off x="0" y="0"/>
+            <a:ext cx="9144000" cy="991351"/>
+          </a:xfrm>
+          <a:prstGeom prst="rect">
+            <a:avLst/>
+          </a:prstGeom>
+          <a:noFill/>
+          <a:ln>
+            <a:noFill/>
+          </a:ln>
+        </p:spPr>
+        <p:txBody>
+          <a:bodyPr lIns="274300" tIns="45700" rIns="91425" bIns="45700" anchor="ctr" anchorCtr="0">
+            <a:noAutofit/>
+          </a:bodyPr>
+          <a:lstStyle/>
+          <a:p>
+            <a:pPr marL="0" marR="0" lvl="0" indent="0" algn="ctr" rtl="0">
+              <a:spcBef>
+                <a:spcPts val="0"/>
+              </a:spcBef>
+              <a:buClr>
+                <a:srgbClr val="EEB211"/>
+              </a:buClr>
+              <a:buSzPct val="25000"/>
+              <a:buFont typeface="Calibri"/>
+              <a:buNone/>
+            </a:pPr>
+            <a:r>
+              <a:rPr lang="en-US" sz="2400" b="0" i="0" u="none" strike="noStrike" cap="none" dirty="0">
+                <a:solidFill>
+                  <a:srgbClr val="EEB211"/>
+                </a:solidFill>
+                <a:latin typeface="Calibri"/>
+                <a:ea typeface="Calibri"/>
+                <a:cs typeface="Calibri"/>
+                <a:sym typeface="Calibri"/>
+              </a:rPr>
+              <a:t> </a:t>
+            </a:r>
+            <a:r>
+              <a:rPr lang="en-US" sz="2400" b="0" i="0" u="none" strike="noStrike" cap="none" dirty="0" smtClean="0">
+                <a:solidFill>
+                  <a:srgbClr val="EEB211"/>
+                </a:solidFill>
+                <a:latin typeface="Calibri"/>
+                <a:ea typeface="Calibri"/>
+                <a:cs typeface="Calibri"/>
+                <a:sym typeface="Calibri"/>
+              </a:rPr>
+              <a:t>RESEARCH – SURVEY RESULTS</a:t>
+            </a:r>
+            <a:endParaRPr lang="en-US" sz="2400" b="0" i="0" u="none" strike="noStrike" cap="none" dirty="0">
+              <a:solidFill>
+                <a:srgbClr val="EEB211"/>
+              </a:solidFill>
+              <a:latin typeface="Calibri"/>
+              <a:ea typeface="Calibri"/>
+              <a:cs typeface="Calibri"/>
+              <a:sym typeface="Calibri"/>
+            </a:endParaRPr>
+          </a:p>
+        </p:txBody>
+      </p:sp>
+      <p:pic>
+        <p:nvPicPr>
+          <p:cNvPr id="5" name="Picture 4"/>
+          <p:cNvPicPr>
+            <a:picLocks noChangeAspect="1"/>
+          </p:cNvPicPr>
+          <p:nvPr/>
+        </p:nvPicPr>
+        <p:blipFill>
+          <a:blip r:embed="rId3"/>
+          <a:stretch>
+            <a:fillRect/>
+          </a:stretch>
+        </p:blipFill>
+        <p:spPr>
+          <a:xfrm>
+            <a:off x="1307909" y="1195912"/>
+            <a:ext cx="6471443" cy="5113447"/>
+          </a:xfrm>
+          <a:prstGeom prst="rect">
+            <a:avLst/>
+          </a:prstGeom>
+        </p:spPr>
+      </p:pic>
+    </p:spTree>
+    <p:extLst>
+      <p:ext uri="{BB962C8B-B14F-4D97-AF65-F5344CB8AC3E}">
+        <p14:creationId xmlns:p14="http://schemas.microsoft.com/office/powerpoint/2010/main" val="4016748279"/>
+      </p:ext>
+    </p:extLst>
+  </p:cSld>
+  <p:clrMapOvr>
+    <a:masterClrMapping/>
+  </p:clrMapOvr>
+  <p:transition spd="slow">
+    <p:cut/>
+  </p:transition>
+  <p:timing>
+    <p:tnLst>
+      <p:par>
+        <p:cTn id="1" dur="indefinite" restart="never" nodeType="tmRoot"/>
+      </p:par>
+    </p:tnLst>
+  </p:timing>
+</p:sld>
+</file>
+
+<file path=ppt/slides/slide11.xml><?xml version="1.0" encoding="utf-8"?>
+<p:sld xmlns:a="http://schemas.openxmlformats.org/drawingml/2006/main" xmlns:r="http://schemas.openxmlformats.org/officeDocument/2006/relationships" xmlns:p="http://schemas.openxmlformats.org/presentationml/2006/main">
+  <p:cSld>
+    <p:spTree>
+      <p:nvGrpSpPr>
+        <p:cNvPr id="1" name="Shape 143"/>
+        <p:cNvGrpSpPr/>
+        <p:nvPr/>
+      </p:nvGrpSpPr>
+      <p:grpSpPr>
+        <a:xfrm>
+          <a:off x="0" y="0"/>
+          <a:ext cx="0" cy="0"/>
+          <a:chOff x="0" y="0"/>
+          <a:chExt cx="0" cy="0"/>
+        </a:xfrm>
+      </p:grpSpPr>
+      <p:sp>
+        <p:nvSpPr>
+          <p:cNvPr id="144" name="Shape 144"/>
+          <p:cNvSpPr txBox="1">
+            <a:spLocks noGrp="1"/>
+          </p:cNvSpPr>
+          <p:nvPr>
+            <p:ph type="body" idx="1"/>
+          </p:nvPr>
+        </p:nvSpPr>
+        <p:spPr>
+          <a:xfrm>
             <a:off x="0" y="999067"/>
             <a:ext cx="9143998" cy="5164664"/>
           </a:xfrm>
@@ -20212,10 +20668,17 @@
   <p:transition spd="slow">
     <p:cut/>
   </p:transition>
+  <p:timing>
+    <p:tnLst>
+      <p:par>
+        <p:cTn id="1" dur="indefinite" restart="never" nodeType="tmRoot"/>
+      </p:par>
+    </p:tnLst>
+  </p:timing>
 </p:sld>
 </file>
 
-<file path=ppt/slides/slide11.xml><?xml version="1.0" encoding="utf-8"?>
+<file path=ppt/slides/slide12.xml><?xml version="1.0" encoding="utf-8"?>
 <p:sld xmlns:a="http://schemas.openxmlformats.org/drawingml/2006/main" xmlns:r="http://schemas.openxmlformats.org/officeDocument/2006/relationships" xmlns:p="http://schemas.openxmlformats.org/presentationml/2006/main">
   <p:cSld>
     <p:spTree>
@@ -20696,10 +21159,17 @@
   <p:transition spd="slow">
     <p:cut/>
   </p:transition>
+  <p:timing>
+    <p:tnLst>
+      <p:par>
+        <p:cTn id="1" dur="indefinite" restart="never" nodeType="tmRoot"/>
+      </p:par>
+    </p:tnLst>
+  </p:timing>
 </p:sld>
 </file>
 
-<file path=ppt/slides/slide12.xml><?xml version="1.0" encoding="utf-8"?>
+<file path=ppt/slides/slide13.xml><?xml version="1.0" encoding="utf-8"?>
 <p:sld xmlns:a="http://schemas.openxmlformats.org/drawingml/2006/main" xmlns:r="http://schemas.openxmlformats.org/officeDocument/2006/relationships" xmlns:p="http://schemas.openxmlformats.org/presentationml/2006/main">
   <p:cSld>
     <p:spTree>
@@ -21168,304 +21638,13 @@
   <p:transition spd="slow">
     <p:cut/>
   </p:transition>
-</p:sld>
-</file>
-
-<file path=ppt/slides/slide13.xml><?xml version="1.0" encoding="utf-8"?>
-<p:sld xmlns:a="http://schemas.openxmlformats.org/drawingml/2006/main" xmlns:r="http://schemas.openxmlformats.org/officeDocument/2006/relationships" xmlns:p="http://schemas.openxmlformats.org/presentationml/2006/main">
-  <p:cSld>
-    <p:spTree>
-      <p:nvGrpSpPr>
-        <p:cNvPr id="1" name="Shape 155"/>
-        <p:cNvGrpSpPr/>
-        <p:nvPr/>
-      </p:nvGrpSpPr>
-      <p:grpSpPr>
-        <a:xfrm>
-          <a:off x="0" y="0"/>
-          <a:ext cx="0" cy="0"/>
-          <a:chOff x="0" y="0"/>
-          <a:chExt cx="0" cy="0"/>
-        </a:xfrm>
-      </p:grpSpPr>
-      <p:sp>
-        <p:nvSpPr>
-          <p:cNvPr id="156" name="Shape 156"/>
-          <p:cNvSpPr txBox="1">
-            <a:spLocks noGrp="1"/>
-          </p:cNvSpPr>
-          <p:nvPr>
-            <p:ph type="body" idx="1"/>
-          </p:nvPr>
-        </p:nvSpPr>
-        <p:spPr>
-          <a:xfrm>
-            <a:off x="0" y="999067"/>
-            <a:ext cx="9143998" cy="5164664"/>
-          </a:xfrm>
-          <a:prstGeom prst="rect">
-            <a:avLst/>
-          </a:prstGeom>
-          <a:noFill/>
-          <a:ln>
-            <a:noFill/>
-          </a:ln>
-        </p:spPr>
-        <p:txBody>
-          <a:bodyPr lIns="274300" tIns="45700" rIns="274300" bIns="45700" anchor="t" anchorCtr="0">
-            <a:noAutofit/>
-          </a:bodyPr>
-          <a:lstStyle/>
-          <a:p>
-            <a:pPr marL="0" marR="0" lvl="0" indent="0" algn="l" rtl="0">
-              <a:spcBef>
-                <a:spcPts val="0"/>
-              </a:spcBef>
-              <a:spcAft>
-                <a:spcPts val="0"/>
-              </a:spcAft>
-              <a:buClr>
-                <a:schemeClr val="lt1"/>
-              </a:buClr>
-              <a:buSzPct val="25000"/>
-              <a:buFont typeface="Arial"/>
-              <a:buNone/>
-            </a:pPr>
-            <a:r>
-              <a:rPr lang="en-US" b="0" i="0" u="none" strike="noStrike" cap="none" dirty="0">
-                <a:solidFill>
-                  <a:schemeClr val="lt1"/>
-                </a:solidFill>
-                <a:latin typeface="Calibri"/>
-                <a:ea typeface="Calibri"/>
-                <a:cs typeface="Calibri"/>
-                <a:sym typeface="Calibri"/>
-              </a:rPr>
-              <a:t>Benefits to Users</a:t>
-            </a:r>
-          </a:p>
-          <a:p>
-            <a:pPr lvl="1">
-              <a:spcBef>
-                <a:spcPts val="960"/>
-              </a:spcBef>
-              <a:spcAft>
-                <a:spcPts val="0"/>
-              </a:spcAft>
-              <a:buFont typeface="Arial"/>
-              <a:buChar char="•"/>
-            </a:pPr>
-            <a:r>
-              <a:rPr lang="en-US" sz="2000" dirty="0" smtClean="0"/>
-              <a:t>Concise </a:t>
-            </a:r>
-            <a:r>
-              <a:rPr lang="en-US" sz="2000" dirty="0"/>
-              <a:t>vaccination information makes sure the users are getting just what they need</a:t>
-            </a:r>
-            <a:endParaRPr lang="en-US" sz="2000" b="0" i="0" u="none" strike="noStrike" cap="none" dirty="0" smtClean="0">
-              <a:solidFill>
-                <a:schemeClr val="lt1"/>
-              </a:solidFill>
-              <a:sym typeface="Calibri"/>
-            </a:endParaRPr>
-          </a:p>
-          <a:p>
-            <a:pPr lvl="1">
-              <a:spcBef>
-                <a:spcPts val="960"/>
-              </a:spcBef>
-              <a:spcAft>
-                <a:spcPts val="0"/>
-              </a:spcAft>
-              <a:buFont typeface="Arial"/>
-              <a:buChar char="•"/>
-            </a:pPr>
-            <a:r>
-              <a:rPr lang="en-US" sz="2000" dirty="0"/>
-              <a:t>One-stop shop for all of the user's </a:t>
-            </a:r>
-            <a:r>
-              <a:rPr lang="en-US" sz="2000" dirty="0" smtClean="0"/>
-              <a:t>location-specific </a:t>
-            </a:r>
-            <a:r>
-              <a:rPr lang="en-US" sz="2000" dirty="0"/>
-              <a:t>health needs. No "homework" </a:t>
-            </a:r>
-            <a:r>
-              <a:rPr lang="en-US" sz="2000" dirty="0" smtClean="0"/>
-              <a:t>needed</a:t>
-            </a:r>
-          </a:p>
-          <a:p>
-            <a:pPr lvl="1">
-              <a:spcBef>
-                <a:spcPts val="960"/>
-              </a:spcBef>
-              <a:spcAft>
-                <a:spcPts val="0"/>
-              </a:spcAft>
-              <a:buFont typeface="Arial"/>
-              <a:buChar char="•"/>
-            </a:pPr>
-            <a:r>
-              <a:rPr lang="en-US" sz="2000" b="0" i="0" u="none" strike="noStrike" cap="none" dirty="0" smtClean="0">
-                <a:solidFill>
-                  <a:schemeClr val="lt1"/>
-                </a:solidFill>
-                <a:sym typeface="Calibri"/>
-              </a:rPr>
-              <a:t> </a:t>
-            </a:r>
-            <a:r>
-              <a:rPr lang="en-US" sz="2000" dirty="0"/>
-              <a:t>Online check list helps the user organize his\her health-related preparation before the </a:t>
-            </a:r>
-            <a:r>
-              <a:rPr lang="en-US" sz="2000" dirty="0" smtClean="0"/>
-              <a:t>trip</a:t>
-            </a:r>
-          </a:p>
-          <a:p>
-            <a:pPr lvl="1">
-              <a:spcBef>
-                <a:spcPts val="960"/>
-              </a:spcBef>
-              <a:spcAft>
-                <a:spcPts val="0"/>
-              </a:spcAft>
-              <a:buFont typeface="Arial"/>
-              <a:buChar char="•"/>
-            </a:pPr>
-            <a:r>
-              <a:rPr lang="en-US" sz="2000" dirty="0"/>
-              <a:t>Simple and clear guidelines help the user protect his\her health while on the trip</a:t>
-            </a:r>
-            <a:endParaRPr lang="en-US" sz="2000" b="0" i="0" u="none" strike="noStrike" cap="none" dirty="0">
-              <a:solidFill>
-                <a:schemeClr val="lt1"/>
-              </a:solidFill>
-              <a:sym typeface="Calibri"/>
-            </a:endParaRPr>
-          </a:p>
-          <a:p>
-            <a:pPr lvl="1">
-              <a:spcBef>
-                <a:spcPts val="960"/>
-              </a:spcBef>
-              <a:spcAft>
-                <a:spcPts val="0"/>
-              </a:spcAft>
-              <a:buFont typeface="Arial"/>
-              <a:buChar char="•"/>
-            </a:pPr>
-            <a:r>
-              <a:rPr lang="en-US" sz="2000" b="0" i="0" u="none" strike="noStrike" cap="none" dirty="0">
-                <a:solidFill>
-                  <a:schemeClr val="lt1"/>
-                </a:solidFill>
-                <a:sym typeface="Calibri"/>
-              </a:rPr>
-              <a:t> Users get real time warnings about health hazards around them</a:t>
-            </a:r>
-          </a:p>
-          <a:p>
-            <a:pPr lvl="1" indent="0">
-              <a:spcBef>
-                <a:spcPts val="960"/>
-              </a:spcBef>
-              <a:spcAft>
-                <a:spcPts val="0"/>
-              </a:spcAft>
-              <a:buSzPct val="25000"/>
-              <a:buFont typeface="Arial"/>
-              <a:buNone/>
-            </a:pPr>
-            <a:endParaRPr sz="2000" b="0" i="0" u="none" strike="noStrike" cap="none" dirty="0">
-              <a:solidFill>
-                <a:schemeClr val="lt1"/>
-              </a:solidFill>
-              <a:sym typeface="Calibri"/>
-            </a:endParaRPr>
-          </a:p>
-        </p:txBody>
-      </p:sp>
-      <p:sp>
-        <p:nvSpPr>
-          <p:cNvPr id="157" name="Shape 157"/>
-          <p:cNvSpPr txBox="1">
-            <a:spLocks noGrp="1"/>
-          </p:cNvSpPr>
-          <p:nvPr>
-            <p:ph type="title"/>
-          </p:nvPr>
-        </p:nvSpPr>
-        <p:spPr>
-          <a:xfrm>
-            <a:off x="0" y="0"/>
-            <a:ext cx="9144000" cy="991351"/>
-          </a:xfrm>
-          <a:prstGeom prst="rect">
-            <a:avLst/>
-          </a:prstGeom>
-          <a:noFill/>
-          <a:ln>
-            <a:noFill/>
-          </a:ln>
-        </p:spPr>
-        <p:txBody>
-          <a:bodyPr lIns="274300" tIns="45700" rIns="91425" bIns="45700" anchor="ctr" anchorCtr="0">
-            <a:noAutofit/>
-          </a:bodyPr>
-          <a:lstStyle/>
-          <a:p>
-            <a:pPr marL="0" marR="0" lvl="0" indent="0" algn="ctr" rtl="0">
-              <a:spcBef>
-                <a:spcPts val="0"/>
-              </a:spcBef>
-              <a:buClr>
-                <a:srgbClr val="EEB211"/>
-              </a:buClr>
-              <a:buSzPct val="25000"/>
-              <a:buFont typeface="Calibri"/>
-              <a:buNone/>
-            </a:pPr>
-            <a:r>
-              <a:rPr lang="en-US" sz="2400" b="0" i="0" u="none" strike="noStrike" cap="none" dirty="0" smtClean="0">
-                <a:solidFill>
-                  <a:srgbClr val="EEB211"/>
-                </a:solidFill>
-                <a:latin typeface="Calibri"/>
-                <a:ea typeface="Calibri"/>
-                <a:cs typeface="Calibri"/>
-                <a:sym typeface="Calibri"/>
-              </a:rPr>
-              <a:t>BUSINESS </a:t>
-            </a:r>
-            <a:r>
-              <a:rPr lang="en-US" sz="2400" b="0" i="0" u="none" strike="noStrike" cap="none" dirty="0">
-                <a:solidFill>
-                  <a:srgbClr val="EEB211"/>
-                </a:solidFill>
-                <a:latin typeface="Calibri"/>
-                <a:ea typeface="Calibri"/>
-                <a:cs typeface="Calibri"/>
-                <a:sym typeface="Calibri"/>
-              </a:rPr>
-              <a:t>CASE</a:t>
-            </a:r>
-          </a:p>
-        </p:txBody>
-      </p:sp>
-    </p:spTree>
-  </p:cSld>
-  <p:clrMapOvr>
-    <a:masterClrMapping/>
-  </p:clrMapOvr>
-  <p:transition spd="slow">
-    <p:cut/>
-  </p:transition>
+  <p:timing>
+    <p:tnLst>
+      <p:par>
+        <p:cTn id="1" dur="indefinite" restart="never" nodeType="tmRoot"/>
+      </p:par>
+    </p:tnLst>
+  </p:timing>
 </p:sld>
 </file>
 
@@ -21517,7 +21696,7 @@
           <a:p>
             <a:pPr marL="0" marR="0" lvl="0" indent="0" algn="l" rtl="0">
               <a:spcBef>
-                <a:spcPts val="960"/>
+                <a:spcPts val="0"/>
               </a:spcBef>
               <a:spcAft>
                 <a:spcPts val="0"/>
@@ -21530,7 +21709,7 @@
               <a:buNone/>
             </a:pPr>
             <a:r>
-              <a:rPr lang="en-US" b="0" i="0" u="none" strike="noStrike" cap="none" dirty="0" smtClean="0">
+              <a:rPr lang="en-US" b="0" i="0" u="none" strike="noStrike" cap="none" dirty="0">
                 <a:solidFill>
                   <a:schemeClr val="lt1"/>
                 </a:solidFill>
@@ -21539,19 +21718,7 @@
                 <a:cs typeface="Calibri"/>
                 <a:sym typeface="Calibri"/>
               </a:rPr>
-              <a:t>Benefits </a:t>
-            </a:r>
-            <a:r>
-              <a:rPr lang="en-US" b="0" i="0" u="none" strike="noStrike" cap="none" dirty="0">
-                <a:solidFill>
-                  <a:schemeClr val="lt1"/>
-                </a:solidFill>
-                <a:latin typeface="Calibri"/>
-                <a:ea typeface="Calibri"/>
-                <a:cs typeface="Calibri"/>
-                <a:sym typeface="Calibri"/>
-              </a:rPr>
-              <a:t>to Non Users</a:t>
+              <a:t>Benefits to Users</a:t>
             </a:r>
           </a:p>
           <a:p>
@@ -21566,16 +21733,46 @@
               <a:buChar char="•"/>
             </a:pPr>
             <a:r>
-              <a:rPr lang="en-US" sz="1700" dirty="0"/>
-              <a:t> </a:t>
+              <a:rPr lang="en-US" sz="2000" dirty="0" smtClean="0"/>
+              <a:t>Concise </a:t>
             </a:r>
             <a:r>
               <a:rPr lang="en-US" sz="2000" dirty="0"/>
-              <a:t>Travelers that are informed of an outbreak in a certain area and avoid visiting this area help in not spreading the disease in their future destinations</a:t>
+              <a:t>vaccination information makes sure the users are getting just what they need</a:t>
+            </a:r>
+            <a:endParaRPr lang="en-US" sz="2000" b="0" i="0" u="none" strike="noStrike" cap="none" dirty="0" smtClean="0">
+              <a:solidFill>
+                <a:schemeClr val="lt1"/>
+              </a:solidFill>
+              <a:sym typeface="Calibri"/>
+            </a:endParaRPr>
+          </a:p>
+          <a:p>
+            <a:pPr lvl="1">
+              <a:spcBef>
+                <a:spcPts val="960"/>
+              </a:spcBef>
+              <a:spcAft>
+                <a:spcPts val="0"/>
+              </a:spcAft>
+              <a:buFont typeface="Arial"/>
+              <a:buChar char="•"/>
+            </a:pPr>
+            <a:r>
+              <a:rPr lang="en-US" sz="2000" dirty="0"/>
+              <a:t>One-stop shop for all of the user's </a:t>
             </a:r>
             <a:r>
               <a:rPr lang="en-US" sz="2000" dirty="0" smtClean="0"/>
-              <a:t>.</a:t>
+              <a:t>location-specific </a:t>
+            </a:r>
+            <a:r>
+              <a:rPr lang="en-US" sz="2000" dirty="0"/>
+              <a:t>health needs. No "homework" </a:t>
+            </a:r>
+            <a:r>
+              <a:rPr lang="en-US" sz="2000" dirty="0" smtClean="0"/>
+              <a:t>needed</a:t>
             </a:r>
           </a:p>
           <a:p>
@@ -21589,7 +21786,23 @@
               <a:buFont typeface="Arial"/>
               <a:buChar char="•"/>
             </a:pPr>
-            <a:endParaRPr lang="en-US" sz="2000" dirty="0"/>
+            <a:r>
+              <a:rPr lang="en-US" sz="2000" b="0" i="0" u="none" strike="noStrike" cap="none" dirty="0" smtClean="0">
+                <a:solidFill>
+                  <a:schemeClr val="lt1"/>
+                </a:solidFill>
+                <a:sym typeface="Calibri"/>
+              </a:rPr>
+              <a:t> </a:t>
+            </a:r>
+            <a:r>
+              <a:rPr lang="en-US" sz="2000" dirty="0"/>
+              <a:t>Online check list helps the user organize his\her health-related preparation before the </a:t>
+            </a:r>
+            <a:r>
+              <a:rPr lang="en-US" sz="2000" dirty="0" smtClean="0"/>
+              <a:t>trip</a:t>
+            </a:r>
           </a:p>
           <a:p>
             <a:pPr lvl="1">
@@ -21603,14 +21816,15 @@
               <a:buChar char="•"/>
             </a:pPr>
             <a:r>
-              <a:rPr lang="en-US" sz="2000" dirty="0" smtClean="0"/>
-              <a:t>Mitigating </a:t>
+              <a:rPr lang="en-US" sz="2000" dirty="0"/>
+              <a:t>Simple and clear guidelines help the user protect his\her health while on the trip</a:t>
             </a:r>
-            <a:r>
-              <a:rPr lang="en-US" sz="2000" dirty="0"/>
-              <a:t>chances of infection in travelers also means mitigating these chances for the people who come in contact with these tourists, especially after they return home. </a:t>
-            </a:r>
-            <a:endParaRPr lang="en-US" sz="2000" dirty="0" smtClean="0"/>
+            <a:endParaRPr lang="en-US" sz="2000" b="0" i="0" u="none" strike="noStrike" cap="none" dirty="0">
+              <a:solidFill>
+                <a:schemeClr val="lt1"/>
+              </a:solidFill>
+              <a:sym typeface="Calibri"/>
+            </a:endParaRPr>
           </a:p>
           <a:p>
             <a:pPr lvl="1">
@@ -21623,36 +21837,29 @@
               <a:buFont typeface="Arial"/>
               <a:buChar char="•"/>
             </a:pPr>
-            <a:endParaRPr lang="en-US" sz="2000" dirty="0" smtClean="0"/>
+            <a:r>
+              <a:rPr lang="en-US" sz="2000" b="0" i="0" u="none" strike="noStrike" cap="none" dirty="0">
+                <a:solidFill>
+                  <a:schemeClr val="lt1"/>
+                </a:solidFill>
+                <a:sym typeface="Calibri"/>
+              </a:rPr>
+              <a:t> Users get real time warnings about health hazards around them</a:t>
+            </a:r>
           </a:p>
           <a:p>
-            <a:pPr lvl="1">
+            <a:pPr lvl="1" indent="0">
               <a:spcBef>
                 <a:spcPts val="960"/>
               </a:spcBef>
               <a:spcAft>
                 <a:spcPts val="0"/>
               </a:spcAft>
-              <a:buFont typeface="Arial"/>
-              <a:buChar char="•"/>
+              <a:buSzPct val="25000"/>
+              <a:buFont typeface="Arial"/>
+              <a:buNone/>
             </a:pPr>
-            <a:r>
-              <a:rPr lang="en-US" sz="2000" dirty="0" smtClean="0"/>
-              <a:t>Healthier </a:t>
-            </a:r>
-            <a:r>
-              <a:rPr lang="en-US" sz="2000" dirty="0"/>
-              <a:t>returning travelers save treatment time and money </a:t>
-            </a:r>
-            <a:r>
-              <a:rPr lang="en-US" sz="2000" dirty="0" smtClean="0"/>
-              <a:t>to health </a:t>
-            </a:r>
-            <a:r>
-              <a:rPr lang="en-US" sz="2000" dirty="0"/>
-              <a:t>organizations.</a:t>
-            </a:r>
-            <a:endParaRPr lang="en-US" sz="2000" b="0" i="0" u="none" strike="noStrike" cap="none" dirty="0">
+            <a:endParaRPr sz="2000" b="0" i="0" u="none" strike="noStrike" cap="none" dirty="0">
               <a:solidFill>
                 <a:schemeClr val="lt1"/>
               </a:solidFill>
@@ -21729,6 +21936,283 @@
         </p:txBody>
       </p:sp>
     </p:spTree>
+  </p:cSld>
+  <p:clrMapOvr>
+    <a:masterClrMapping/>
+  </p:clrMapOvr>
+  <p:transition spd="slow">
+    <p:cut/>
+  </p:transition>
+  <p:timing>
+    <p:tnLst>
+      <p:par>
+        <p:cTn id="1" dur="indefinite" restart="never" nodeType="tmRoot"/>
+      </p:par>
+    </p:tnLst>
+  </p:timing>
+</p:sld>
+</file>
+
+<file path=ppt/slides/slide15.xml><?xml version="1.0" encoding="utf-8"?>
+<p:sld xmlns:a="http://schemas.openxmlformats.org/drawingml/2006/main" xmlns:r="http://schemas.openxmlformats.org/officeDocument/2006/relationships" xmlns:p="http://schemas.openxmlformats.org/presentationml/2006/main">
+  <p:cSld>
+    <p:spTree>
+      <p:nvGrpSpPr>
+        <p:cNvPr id="1" name="Shape 155"/>
+        <p:cNvGrpSpPr/>
+        <p:nvPr/>
+      </p:nvGrpSpPr>
+      <p:grpSpPr>
+        <a:xfrm>
+          <a:off x="0" y="0"/>
+          <a:ext cx="0" cy="0"/>
+          <a:chOff x="0" y="0"/>
+          <a:chExt cx="0" cy="0"/>
+        </a:xfrm>
+      </p:grpSpPr>
+      <p:sp>
+        <p:nvSpPr>
+          <p:cNvPr id="156" name="Shape 156"/>
+          <p:cNvSpPr txBox="1">
+            <a:spLocks noGrp="1"/>
+          </p:cNvSpPr>
+          <p:nvPr>
+            <p:ph type="body" idx="1"/>
+          </p:nvPr>
+        </p:nvSpPr>
+        <p:spPr>
+          <a:xfrm>
+            <a:off x="0" y="999067"/>
+            <a:ext cx="9143998" cy="5164664"/>
+          </a:xfrm>
+          <a:prstGeom prst="rect">
+            <a:avLst/>
+          </a:prstGeom>
+          <a:noFill/>
+          <a:ln>
+            <a:noFill/>
+          </a:ln>
+        </p:spPr>
+        <p:txBody>
+          <a:bodyPr lIns="274300" tIns="45700" rIns="274300" bIns="45700" anchor="t" anchorCtr="0">
+            <a:noAutofit/>
+          </a:bodyPr>
+          <a:lstStyle/>
+          <a:p>
+            <a:pPr marL="0" marR="0" lvl="0" indent="0" algn="l" rtl="0">
+              <a:spcBef>
+                <a:spcPts val="960"/>
+              </a:spcBef>
+              <a:spcAft>
+                <a:spcPts val="0"/>
+              </a:spcAft>
+              <a:buClr>
+                <a:schemeClr val="lt1"/>
+              </a:buClr>
+              <a:buSzPct val="25000"/>
+              <a:buFont typeface="Arial"/>
+              <a:buNone/>
+            </a:pPr>
+            <a:r>
+              <a:rPr lang="en-US" b="0" i="0" u="none" strike="noStrike" cap="none" dirty="0" smtClean="0">
+                <a:solidFill>
+                  <a:schemeClr val="lt1"/>
+                </a:solidFill>
+                <a:latin typeface="Calibri"/>
+                <a:ea typeface="Calibri"/>
+                <a:cs typeface="Calibri"/>
+                <a:sym typeface="Calibri"/>
+              </a:rPr>
+              <a:t>Benefits </a:t>
+            </a:r>
+            <a:r>
+              <a:rPr lang="en-US" b="0" i="0" u="none" strike="noStrike" cap="none" dirty="0">
+                <a:solidFill>
+                  <a:schemeClr val="lt1"/>
+                </a:solidFill>
+                <a:latin typeface="Calibri"/>
+                <a:ea typeface="Calibri"/>
+                <a:cs typeface="Calibri"/>
+                <a:sym typeface="Calibri"/>
+              </a:rPr>
+              <a:t>to Non Users</a:t>
+            </a:r>
+          </a:p>
+          <a:p>
+            <a:pPr lvl="1">
+              <a:spcBef>
+                <a:spcPts val="960"/>
+              </a:spcBef>
+              <a:spcAft>
+                <a:spcPts val="0"/>
+              </a:spcAft>
+              <a:buFont typeface="Arial"/>
+              <a:buChar char="•"/>
+            </a:pPr>
+            <a:r>
+              <a:rPr lang="en-US" sz="1700" dirty="0"/>
+              <a:t> </a:t>
+            </a:r>
+            <a:r>
+              <a:rPr lang="en-US" sz="2000" dirty="0"/>
+              <a:t>Travelers that are informed of an outbreak in a certain area and avoid visiting this area help in not spreading the disease in their future destinations</a:t>
+            </a:r>
+            <a:r>
+              <a:rPr lang="en-US" sz="2000" dirty="0" smtClean="0"/>
+              <a:t>.</a:t>
+            </a:r>
+          </a:p>
+          <a:p>
+            <a:pPr lvl="1">
+              <a:spcBef>
+                <a:spcPts val="960"/>
+              </a:spcBef>
+              <a:spcAft>
+                <a:spcPts val="0"/>
+              </a:spcAft>
+              <a:buFont typeface="Arial"/>
+              <a:buChar char="•"/>
+            </a:pPr>
+            <a:endParaRPr lang="en-US" sz="2000" dirty="0"/>
+          </a:p>
+          <a:p>
+            <a:pPr lvl="1">
+              <a:spcBef>
+                <a:spcPts val="960"/>
+              </a:spcBef>
+              <a:spcAft>
+                <a:spcPts val="0"/>
+              </a:spcAft>
+              <a:buFont typeface="Arial"/>
+              <a:buChar char="•"/>
+            </a:pPr>
+            <a:r>
+              <a:rPr lang="en-US" sz="2000" dirty="0" smtClean="0"/>
+              <a:t>Mitigating </a:t>
+            </a:r>
+            <a:r>
+              <a:rPr lang="en-US" sz="2000" dirty="0"/>
+              <a:t>chances of infection in travelers also means mitigating these chances for the people who come in contact with these tourists, especially after they return home. </a:t>
+            </a:r>
+            <a:endParaRPr lang="en-US" sz="2000" dirty="0" smtClean="0"/>
+          </a:p>
+          <a:p>
+            <a:pPr lvl="1">
+              <a:spcBef>
+                <a:spcPts val="960"/>
+              </a:spcBef>
+              <a:spcAft>
+                <a:spcPts val="0"/>
+              </a:spcAft>
+              <a:buFont typeface="Arial"/>
+              <a:buChar char="•"/>
+            </a:pPr>
+            <a:endParaRPr lang="en-US" sz="2000" dirty="0" smtClean="0"/>
+          </a:p>
+          <a:p>
+            <a:pPr lvl="1">
+              <a:spcBef>
+                <a:spcPts val="960"/>
+              </a:spcBef>
+              <a:spcAft>
+                <a:spcPts val="0"/>
+              </a:spcAft>
+              <a:buFont typeface="Arial"/>
+              <a:buChar char="•"/>
+            </a:pPr>
+            <a:r>
+              <a:rPr lang="en-US" sz="2000" dirty="0" smtClean="0"/>
+              <a:t>Healthier </a:t>
+            </a:r>
+            <a:r>
+              <a:rPr lang="en-US" sz="2000" dirty="0"/>
+              <a:t>returning travelers save treatment time and money </a:t>
+            </a:r>
+            <a:r>
+              <a:rPr lang="en-US" sz="2000" dirty="0" smtClean="0"/>
+              <a:t>to health </a:t>
+            </a:r>
+            <a:r>
+              <a:rPr lang="en-US" sz="2000" dirty="0"/>
+              <a:t>organizations.</a:t>
+            </a:r>
+            <a:endParaRPr lang="en-US" sz="2000" b="0" i="0" u="none" strike="noStrike" cap="none" dirty="0">
+              <a:solidFill>
+                <a:schemeClr val="lt1"/>
+              </a:solidFill>
+              <a:sym typeface="Calibri"/>
+            </a:endParaRPr>
+          </a:p>
+        </p:txBody>
+      </p:sp>
+      <p:sp>
+        <p:nvSpPr>
+          <p:cNvPr id="157" name="Shape 157"/>
+          <p:cNvSpPr txBox="1">
+            <a:spLocks noGrp="1"/>
+          </p:cNvSpPr>
+          <p:nvPr>
+            <p:ph type="title"/>
+          </p:nvPr>
+        </p:nvSpPr>
+        <p:spPr>
+          <a:xfrm>
+            <a:off x="0" y="0"/>
+            <a:ext cx="9144000" cy="991351"/>
+          </a:xfrm>
+          <a:prstGeom prst="rect">
+            <a:avLst/>
+          </a:prstGeom>
+          <a:noFill/>
+          <a:ln>
+            <a:noFill/>
+          </a:ln>
+        </p:spPr>
+        <p:txBody>
+          <a:bodyPr lIns="274300" tIns="45700" rIns="91425" bIns="45700" anchor="ctr" anchorCtr="0">
+            <a:noAutofit/>
+          </a:bodyPr>
+          <a:lstStyle/>
+          <a:p>
+            <a:pPr marL="0" marR="0" lvl="0" indent="0" algn="ctr" rtl="0">
+              <a:spcBef>
+                <a:spcPts val="0"/>
+              </a:spcBef>
+              <a:buClr>
+                <a:srgbClr val="EEB211"/>
+              </a:buClr>
+              <a:buSzPct val="25000"/>
+              <a:buFont typeface="Calibri"/>
+              <a:buNone/>
+            </a:pPr>
+            <a:r>
+              <a:rPr lang="en-US" sz="2400" b="0" i="0" u="none" strike="noStrike" cap="none" dirty="0" smtClean="0">
+                <a:solidFill>
+                  <a:srgbClr val="EEB211"/>
+                </a:solidFill>
+                <a:latin typeface="Calibri"/>
+                <a:ea typeface="Calibri"/>
+                <a:cs typeface="Calibri"/>
+                <a:sym typeface="Calibri"/>
+              </a:rPr>
+              <a:t>BUSINESS </a:t>
+            </a:r>
+            <a:r>
+              <a:rPr lang="en-US" sz="2400" b="0" i="0" u="none" strike="noStrike" cap="none" dirty="0">
+                <a:solidFill>
+                  <a:srgbClr val="EEB211"/>
+                </a:solidFill>
+                <a:latin typeface="Calibri"/>
+                <a:ea typeface="Calibri"/>
+                <a:cs typeface="Calibri"/>
+                <a:sym typeface="Calibri"/>
+              </a:rPr>
+              <a:t>CASE</a:t>
+            </a:r>
+          </a:p>
+        </p:txBody>
+      </p:sp>
+    </p:spTree>
     <p:extLst>
       <p:ext uri="{BB962C8B-B14F-4D97-AF65-F5344CB8AC3E}">
         <p14:creationId xmlns:p14="http://schemas.microsoft.com/office/powerpoint/2010/main" val="4043325861"/>
@@ -21741,10 +22225,17 @@
   <p:transition spd="slow">
     <p:cut/>
   </p:transition>
+  <p:timing>
+    <p:tnLst>
+      <p:par>
+        <p:cTn id="1" dur="indefinite" restart="never" nodeType="tmRoot"/>
+      </p:par>
+    </p:tnLst>
+  </p:timing>
 </p:sld>
 </file>
 
-<file path=ppt/slides/slide15.xml><?xml version="1.0" encoding="utf-8"?>
+<file path=ppt/slides/slide16.xml><?xml version="1.0" encoding="utf-8"?>
 <p:sld xmlns:a="http://schemas.openxmlformats.org/drawingml/2006/main" xmlns:r="http://schemas.openxmlformats.org/officeDocument/2006/relationships" xmlns:p="http://schemas.openxmlformats.org/presentationml/2006/main">
   <p:cSld>
     <p:spTree>
@@ -22274,10 +22765,17 @@
   <p:transition spd="slow">
     <p:cut/>
   </p:transition>
+  <p:timing>
+    <p:tnLst>
+      <p:par>
+        <p:cTn id="1" dur="indefinite" restart="never" nodeType="tmRoot"/>
+      </p:par>
+    </p:tnLst>
+  </p:timing>
 </p:sld>
 </file>
 
-<file path=ppt/slides/slide16.xml><?xml version="1.0" encoding="utf-8"?>
+<file path=ppt/slides/slide17.xml><?xml version="1.0" encoding="utf-8"?>
 <p:sld xmlns:a="http://schemas.openxmlformats.org/drawingml/2006/main" xmlns:r="http://schemas.openxmlformats.org/officeDocument/2006/relationships" xmlns:p="http://schemas.openxmlformats.org/presentationml/2006/main">
   <p:cSld>
     <p:spTree>
@@ -22580,10 +23078,17 @@
   <p:transition spd="slow">
     <p:cut/>
   </p:transition>
+  <p:timing>
+    <p:tnLst>
+      <p:par>
+        <p:cTn id="1" dur="indefinite" restart="never" nodeType="tmRoot"/>
+      </p:par>
+    </p:tnLst>
+  </p:timing>
 </p:sld>
 </file>
 
-<file path=ppt/slides/slide17.xml><?xml version="1.0" encoding="utf-8"?>
+<file path=ppt/slides/slide18.xml><?xml version="1.0" encoding="utf-8"?>
 <p:sld xmlns:a="http://schemas.openxmlformats.org/drawingml/2006/main" xmlns:r="http://schemas.openxmlformats.org/officeDocument/2006/relationships" xmlns:p="http://schemas.openxmlformats.org/presentationml/2006/main">
   <p:cSld>
     <p:spTree>
@@ -22890,10 +23395,17 @@
   <p:transition spd="slow">
     <p:cut/>
   </p:transition>
+  <p:timing>
+    <p:tnLst>
+      <p:par>
+        <p:cTn id="1" dur="indefinite" restart="never" nodeType="tmRoot"/>
+      </p:par>
+    </p:tnLst>
+  </p:timing>
 </p:sld>
 </file>
 
-<file path=ppt/slides/slide18.xml><?xml version="1.0" encoding="utf-8"?>
+<file path=ppt/slides/slide19.xml><?xml version="1.0" encoding="utf-8"?>
 <p:sld xmlns:a="http://schemas.openxmlformats.org/drawingml/2006/main" xmlns:r="http://schemas.openxmlformats.org/officeDocument/2006/relationships" xmlns:p="http://schemas.openxmlformats.org/presentationml/2006/main">
   <p:cSld>
     <p:spTree>
@@ -23112,6 +23624,13 @@
   <p:transition spd="slow">
     <p:cut/>
   </p:transition>
+  <p:timing>
+    <p:tnLst>
+      <p:par>
+        <p:cTn id="1" dur="indefinite" restart="never" nodeType="tmRoot"/>
+      </p:par>
+    </p:tnLst>
+  </p:timing>
 </p:sld>
 </file>
 
@@ -23648,6 +24167,13 @@
   <p:transition spd="slow">
     <p:cut/>
   </p:transition>
+  <p:timing>
+    <p:tnLst>
+      <p:par>
+        <p:cTn id="1" dur="indefinite" restart="never" nodeType="tmRoot"/>
+      </p:par>
+    </p:tnLst>
+  </p:timing>
 </p:sld>
 </file>
 
@@ -23740,13 +24266,10 @@
               <a:buChar char="•"/>
             </a:pPr>
             <a:r>
-              <a:rPr lang="en-US" sz="2100" b="0" i="0" u="none" strike="noStrike" cap="none" dirty="0">
-                <a:solidFill>
-                  <a:schemeClr val="lt1"/>
-                </a:solidFill>
-                <a:latin typeface="Calibri"/>
-                <a:ea typeface="Calibri"/>
-                <a:cs typeface="Calibri"/>
+              <a:rPr lang="en-US" sz="2000" b="0" i="0" u="none" strike="noStrike" cap="none" dirty="0">
+                <a:solidFill>
+                  <a:schemeClr val="lt1"/>
+                </a:solidFill>
                 <a:sym typeface="Calibri"/>
               </a:rPr>
               <a:t>Almost by definition, traveling abroad increases exposure to infectious diseases</a:t>
@@ -23768,149 +24291,79 @@
               <a:buChar char="•"/>
             </a:pPr>
             <a:r>
-              <a:rPr lang="en-US" sz="2100" b="0" i="0" u="none" strike="noStrike" cap="none" dirty="0">
-                <a:solidFill>
-                  <a:schemeClr val="lt1"/>
-                </a:solidFill>
-                <a:latin typeface="Calibri"/>
-                <a:ea typeface="Calibri"/>
-                <a:cs typeface="Calibri"/>
+              <a:rPr lang="en-US" sz="2000" b="0" i="0" u="none" strike="noStrike" cap="none" dirty="0">
+                <a:solidFill>
+                  <a:schemeClr val="lt1"/>
+                </a:solidFill>
                 <a:sym typeface="Calibri"/>
               </a:rPr>
-              <a:t> Risk for such exposure is even greater for travelers in underdeveloped countries, which lack public hygiene infrastructure</a:t>
+              <a:t> Risk for such exposure is even greater for travelers in underdeveloped countries, which lack public hygiene </a:t>
+            </a:r>
+            <a:r>
+              <a:rPr lang="en-US" sz="2000" b="0" i="0" u="none" strike="noStrike" cap="none" dirty="0" smtClean="0">
+                <a:solidFill>
+                  <a:schemeClr val="lt1"/>
+                </a:solidFill>
+                <a:sym typeface="Calibri"/>
+              </a:rPr>
+              <a:t>infrastructure</a:t>
             </a:r>
           </a:p>
           <a:p>
-            <a:pPr marL="0" marR="0" lvl="0" indent="0" algn="l" rtl="0">
-              <a:spcBef>
-                <a:spcPts val="1080"/>
+            <a:pPr lvl="1" indent="-288544">
+              <a:spcBef>
+                <a:spcPts val="1020"/>
               </a:spcBef>
               <a:spcAft>
                 <a:spcPts val="0"/>
               </a:spcAft>
-              <a:buClr>
-                <a:schemeClr val="lt1"/>
-              </a:buClr>
-              <a:buSzPct val="25000"/>
-              <a:buFont typeface="Arial"/>
-              <a:buNone/>
-            </a:pPr>
-            <a:endParaRPr sz="2400" b="0" i="0" u="none" strike="noStrike" cap="none" dirty="0">
-              <a:solidFill>
-                <a:schemeClr val="lt1"/>
-              </a:solidFill>
-              <a:latin typeface="Calibri"/>
-              <a:ea typeface="Calibri"/>
-              <a:cs typeface="Calibri"/>
-              <a:sym typeface="Calibri"/>
-            </a:endParaRPr>
-          </a:p>
-          <a:p>
-            <a:pPr marL="0" marR="0" lvl="0" indent="0" algn="l" rtl="0">
-              <a:spcBef>
-                <a:spcPts val="1080"/>
-              </a:spcBef>
-              <a:spcAft>
-                <a:spcPts val="0"/>
-              </a:spcAft>
-              <a:buClr>
-                <a:schemeClr val="lt1"/>
-              </a:buClr>
-              <a:buSzPct val="25000"/>
-              <a:buFont typeface="Arial"/>
-              <a:buNone/>
             </a:pPr>
             <a:r>
-              <a:rPr lang="en-US" sz="2400" b="0" i="0" u="none" strike="noStrike" cap="none" dirty="0">
-                <a:solidFill>
-                  <a:schemeClr val="lt1"/>
-                </a:solidFill>
-                <a:latin typeface="Calibri"/>
-                <a:ea typeface="Calibri"/>
-                <a:cs typeface="Calibri"/>
-                <a:sym typeface="Calibri"/>
-              </a:rPr>
-              <a:t> Project Scope</a:t>
+              <a:rPr lang="en-US" sz="2000" dirty="0"/>
+              <a:t>These diseases may be viral or bacterial, foodborne or waterborne, dangerous only to certain people or to every traveler. </a:t>
+            </a:r>
+            <a:r>
+              <a:rPr lang="en-US" sz="2000" dirty="0" smtClean="0"/>
+              <a:t> </a:t>
             </a:r>
           </a:p>
           <a:p>
-            <a:pPr marL="466344" marR="0" lvl="1" indent="-288544" algn="l" rtl="0">
-              <a:spcBef>
-                <a:spcPts val="1020"/>
+            <a:pPr lvl="0">
+              <a:spcBef>
+                <a:spcPts val="1080"/>
               </a:spcBef>
               <a:spcAft>
                 <a:spcPts val="0"/>
               </a:spcAft>
-              <a:buClr>
-                <a:schemeClr val="lt1"/>
-              </a:buClr>
-              <a:buSzPct val="100000"/>
-              <a:buFont typeface="Merriweather Sans"/>
-              <a:buChar char="•"/>
+              <a:buSzPct val="25000"/>
             </a:pPr>
             <a:r>
-              <a:rPr lang="en-US" sz="2100" b="0" i="0" u="none" strike="noStrike" cap="none" dirty="0">
-                <a:solidFill>
-                  <a:schemeClr val="lt1"/>
-                </a:solidFill>
-                <a:latin typeface="Calibri"/>
-                <a:ea typeface="Calibri"/>
-                <a:cs typeface="Calibri"/>
-                <a:sym typeface="Calibri"/>
-              </a:rPr>
-              <a:t>Push region-specific known conditions or outbreaks to the end user</a:t>
+              <a:rPr lang="en-US" dirty="0" smtClean="0"/>
+              <a:t>Specific Example</a:t>
             </a:r>
           </a:p>
           <a:p>
-            <a:pPr marL="466344" marR="0" lvl="1" indent="-288544" algn="l" rtl="0">
-              <a:spcBef>
-                <a:spcPts val="1020"/>
+            <a:pPr lvl="1">
+              <a:spcBef>
+                <a:spcPts val="1080"/>
               </a:spcBef>
               <a:spcAft>
                 <a:spcPts val="0"/>
               </a:spcAft>
-              <a:buClr>
-                <a:schemeClr val="lt1"/>
-              </a:buClr>
-              <a:buSzPct val="100000"/>
-              <a:buFont typeface="Merriweather Sans"/>
-              <a:buChar char="•"/>
+              <a:buSzPct val="25000"/>
             </a:pPr>
             <a:r>
-              <a:rPr lang="en-US" sz="2100" b="0" i="0" u="none" strike="noStrike" cap="none" dirty="0">
-                <a:solidFill>
-                  <a:schemeClr val="lt1"/>
-                </a:solidFill>
-                <a:latin typeface="Calibri"/>
-                <a:ea typeface="Calibri"/>
-                <a:cs typeface="Calibri"/>
-                <a:sym typeface="Calibri"/>
-              </a:rPr>
-              <a:t>Make customized recommendations about preventing and possibly treating these diseases</a:t>
+              <a:rPr lang="en-US" sz="2000" dirty="0" smtClean="0"/>
+              <a:t>The </a:t>
             </a:r>
-          </a:p>
-          <a:p>
-            <a:pPr marL="466344" marR="0" lvl="1" indent="-288544" algn="l" rtl="0">
-              <a:spcBef>
-                <a:spcPts val="1020"/>
-              </a:spcBef>
-              <a:spcAft>
-                <a:spcPts val="0"/>
-              </a:spcAft>
-              <a:buClr>
-                <a:schemeClr val="lt1"/>
-              </a:buClr>
-              <a:buSzPct val="100000"/>
-              <a:buFont typeface="Merriweather Sans"/>
-              <a:buNone/>
-            </a:pPr>
-            <a:endParaRPr sz="2100" b="0" i="0" u="none" strike="noStrike" cap="none" dirty="0">
+            <a:r>
+              <a:rPr lang="en-US" sz="2000" dirty="0"/>
+              <a:t>Zika virus is currently much in the news. This virus causes birth defects, so it is of particular concern to pregnant women. The virus is spreading rapidly throughout a number of countries by transmission methods that are still being discovered. Travelers need to know what geographical areas are at risk, what kind of human contact transmits the virus and the status of potential vaccines or treatments. </a:t>
+            </a:r>
+            <a:endParaRPr sz="2000" b="0" i="0" u="none" strike="noStrike" cap="none" dirty="0">
               <a:solidFill>
                 <a:schemeClr val="lt1"/>
               </a:solidFill>
-              <a:latin typeface="Calibri"/>
-              <a:ea typeface="Calibri"/>
-              <a:cs typeface="Calibri"/>
               <a:sym typeface="Calibri"/>
             </a:endParaRPr>
           </a:p>
@@ -24088,10 +24541,482 @@
   <p:transition spd="slow">
     <p:cut/>
   </p:transition>
+  <p:timing>
+    <p:tnLst>
+      <p:par>
+        <p:cTn id="1" dur="indefinite" restart="never" nodeType="tmRoot"/>
+      </p:par>
+    </p:tnLst>
+  </p:timing>
 </p:sld>
 </file>
 
 <file path=ppt/slides/slide4.xml><?xml version="1.0" encoding="utf-8"?>
+<p:sld xmlns:a="http://schemas.openxmlformats.org/drawingml/2006/main" xmlns:r="http://schemas.openxmlformats.org/officeDocument/2006/relationships" xmlns:p="http://schemas.openxmlformats.org/presentationml/2006/main">
+  <p:cSld>
+    <p:spTree>
+      <p:nvGrpSpPr>
+        <p:cNvPr id="1" name="Shape 125"/>
+        <p:cNvGrpSpPr/>
+        <p:nvPr/>
+      </p:nvGrpSpPr>
+      <p:grpSpPr>
+        <a:xfrm>
+          <a:off x="0" y="0"/>
+          <a:ext cx="0" cy="0"/>
+          <a:chOff x="0" y="0"/>
+          <a:chExt cx="0" cy="0"/>
+        </a:xfrm>
+      </p:grpSpPr>
+      <p:sp>
+        <p:nvSpPr>
+          <p:cNvPr id="126" name="Shape 126"/>
+          <p:cNvSpPr txBox="1">
+            <a:spLocks noGrp="1"/>
+          </p:cNvSpPr>
+          <p:nvPr>
+            <p:ph type="body" idx="1"/>
+          </p:nvPr>
+        </p:nvSpPr>
+        <p:spPr>
+          <a:xfrm>
+            <a:off x="0" y="999067"/>
+            <a:ext cx="9143998" cy="5164664"/>
+          </a:xfrm>
+          <a:prstGeom prst="rect">
+            <a:avLst/>
+          </a:prstGeom>
+          <a:noFill/>
+          <a:ln>
+            <a:noFill/>
+          </a:ln>
+        </p:spPr>
+        <p:txBody>
+          <a:bodyPr lIns="274300" tIns="45700" rIns="274300" bIns="45700" anchor="t" anchorCtr="0">
+            <a:noAutofit/>
+          </a:bodyPr>
+          <a:lstStyle/>
+          <a:p>
+            <a:pPr marL="0" marR="0" lvl="0" indent="0" algn="l" rtl="0">
+              <a:spcBef>
+                <a:spcPts val="0"/>
+              </a:spcBef>
+              <a:spcAft>
+                <a:spcPts val="0"/>
+              </a:spcAft>
+              <a:buClr>
+                <a:schemeClr val="lt1"/>
+              </a:buClr>
+              <a:buSzPct val="25000"/>
+              <a:buFont typeface="Arial"/>
+              <a:buNone/>
+            </a:pPr>
+            <a:r>
+              <a:rPr lang="en-US" sz="2400" b="0" i="0" u="none" strike="noStrike" cap="none" dirty="0" smtClean="0">
+                <a:solidFill>
+                  <a:schemeClr val="lt1"/>
+                </a:solidFill>
+                <a:latin typeface="Calibri"/>
+                <a:ea typeface="Calibri"/>
+                <a:cs typeface="Calibri"/>
+                <a:sym typeface="Calibri"/>
+              </a:rPr>
+              <a:t>Options</a:t>
+            </a:r>
+            <a:endParaRPr lang="en-US" sz="2400" b="0" i="0" u="none" strike="noStrike" cap="none" dirty="0">
+              <a:solidFill>
+                <a:schemeClr val="lt1"/>
+              </a:solidFill>
+              <a:latin typeface="Calibri"/>
+              <a:ea typeface="Calibri"/>
+              <a:cs typeface="Calibri"/>
+              <a:sym typeface="Calibri"/>
+            </a:endParaRPr>
+          </a:p>
+          <a:p>
+            <a:pPr marL="520700" lvl="1" indent="-342900">
+              <a:spcBef>
+                <a:spcPts val="1020"/>
+              </a:spcBef>
+              <a:spcAft>
+                <a:spcPts val="0"/>
+              </a:spcAft>
+            </a:pPr>
+            <a:r>
+              <a:rPr lang="en-US" dirty="0"/>
+              <a:t>There are at least three possible ways to deal with travel-related health dangers: </a:t>
+            </a:r>
+            <a:endParaRPr lang="en-US" dirty="0"/>
+          </a:p>
+          <a:p>
+            <a:pPr lvl="2" indent="-288544">
+              <a:spcBef>
+                <a:spcPts val="1020"/>
+              </a:spcBef>
+              <a:spcAft>
+                <a:spcPts val="0"/>
+              </a:spcAft>
+            </a:pPr>
+            <a:r>
+              <a:rPr lang="en-US" dirty="0" smtClean="0"/>
+              <a:t> </a:t>
+            </a:r>
+            <a:r>
+              <a:rPr lang="en-US" sz="1800" dirty="0"/>
+              <a:t>Don’t travel anywhere! (Let’s agree that this is not the best solution) </a:t>
+            </a:r>
+            <a:endParaRPr lang="en-US" sz="1800" dirty="0" smtClean="0"/>
+          </a:p>
+          <a:p>
+            <a:pPr lvl="2" indent="-288544">
+              <a:spcBef>
+                <a:spcPts val="1020"/>
+              </a:spcBef>
+              <a:spcAft>
+                <a:spcPts val="0"/>
+              </a:spcAft>
+            </a:pPr>
+            <a:r>
+              <a:rPr lang="en-US" sz="1800" dirty="0" smtClean="0"/>
+              <a:t>Travel </a:t>
+            </a:r>
+            <a:r>
+              <a:rPr lang="en-US" sz="1800" dirty="0"/>
+              <a:t>blindly and hope for the best. </a:t>
+            </a:r>
+            <a:r>
+              <a:rPr lang="en-US" sz="1800" dirty="0" smtClean="0"/>
+              <a:t>( doesn’t </a:t>
+            </a:r>
+            <a:r>
+              <a:rPr lang="en-US" sz="1800" dirty="0"/>
+              <a:t>seem like a great idea either) </a:t>
+            </a:r>
+            <a:endParaRPr lang="en-US" sz="1800" dirty="0" smtClean="0"/>
+          </a:p>
+          <a:p>
+            <a:pPr lvl="2" indent="-288544">
+              <a:spcBef>
+                <a:spcPts val="1020"/>
+              </a:spcBef>
+              <a:spcAft>
+                <a:spcPts val="0"/>
+              </a:spcAft>
+            </a:pPr>
+            <a:r>
+              <a:rPr lang="en-US" sz="1800" dirty="0" smtClean="0"/>
+              <a:t> </a:t>
+            </a:r>
+            <a:r>
+              <a:rPr lang="en-US" sz="1800" dirty="0"/>
+              <a:t>Take necessary precautions to ensure a safe trip. The last option is clearly superior, but with so many potential dangers, how can a traveler stay informed and prepared? </a:t>
+            </a:r>
+            <a:endParaRPr sz="1800" b="0" i="0" u="none" strike="noStrike" cap="none" dirty="0">
+              <a:solidFill>
+                <a:schemeClr val="lt1"/>
+              </a:solidFill>
+              <a:sym typeface="Calibri"/>
+            </a:endParaRPr>
+          </a:p>
+          <a:p>
+            <a:pPr marL="0" marR="0" lvl="0" indent="0" algn="l" rtl="0">
+              <a:spcBef>
+                <a:spcPts val="1080"/>
+              </a:spcBef>
+              <a:spcAft>
+                <a:spcPts val="0"/>
+              </a:spcAft>
+              <a:buClr>
+                <a:schemeClr val="lt1"/>
+              </a:buClr>
+              <a:buSzPct val="25000"/>
+              <a:buFont typeface="Arial"/>
+              <a:buNone/>
+            </a:pPr>
+            <a:r>
+              <a:rPr lang="en-US" sz="2400" b="0" i="0" u="none" strike="noStrike" cap="none" dirty="0">
+                <a:solidFill>
+                  <a:schemeClr val="lt1"/>
+                </a:solidFill>
+                <a:latin typeface="Calibri"/>
+                <a:ea typeface="Calibri"/>
+                <a:cs typeface="Calibri"/>
+                <a:sym typeface="Calibri"/>
+              </a:rPr>
+              <a:t> Project Scope</a:t>
+            </a:r>
+          </a:p>
+          <a:p>
+            <a:pPr marL="466344" marR="0" lvl="1" indent="-288544" algn="l" rtl="0">
+              <a:spcBef>
+                <a:spcPts val="1020"/>
+              </a:spcBef>
+              <a:spcAft>
+                <a:spcPts val="0"/>
+              </a:spcAft>
+              <a:buClr>
+                <a:schemeClr val="lt1"/>
+              </a:buClr>
+              <a:buSzPct val="100000"/>
+              <a:buFont typeface="Merriweather Sans"/>
+              <a:buChar char="•"/>
+            </a:pPr>
+            <a:r>
+              <a:rPr lang="en-US" sz="2100" b="0" i="0" u="none" strike="noStrike" cap="none" dirty="0">
+                <a:solidFill>
+                  <a:schemeClr val="lt1"/>
+                </a:solidFill>
+                <a:latin typeface="Calibri"/>
+                <a:ea typeface="Calibri"/>
+                <a:cs typeface="Calibri"/>
+                <a:sym typeface="Calibri"/>
+              </a:rPr>
+              <a:t>Push region-specific known conditions or outbreaks to the end user</a:t>
+            </a:r>
+          </a:p>
+          <a:p>
+            <a:pPr marL="466344" marR="0" lvl="1" indent="-288544" algn="l" rtl="0">
+              <a:spcBef>
+                <a:spcPts val="1020"/>
+              </a:spcBef>
+              <a:spcAft>
+                <a:spcPts val="0"/>
+              </a:spcAft>
+              <a:buClr>
+                <a:schemeClr val="lt1"/>
+              </a:buClr>
+              <a:buSzPct val="100000"/>
+              <a:buFont typeface="Merriweather Sans"/>
+              <a:buChar char="•"/>
+            </a:pPr>
+            <a:r>
+              <a:rPr lang="en-US" sz="2100" b="0" i="0" u="none" strike="noStrike" cap="none" dirty="0">
+                <a:solidFill>
+                  <a:schemeClr val="lt1"/>
+                </a:solidFill>
+                <a:latin typeface="Calibri"/>
+                <a:ea typeface="Calibri"/>
+                <a:cs typeface="Calibri"/>
+                <a:sym typeface="Calibri"/>
+              </a:rPr>
+              <a:t>Make customized recommendations about preventing and possibly treating these diseases</a:t>
+            </a:r>
+          </a:p>
+          <a:p>
+            <a:pPr marL="466344" marR="0" lvl="1" indent="-288544" algn="l" rtl="0">
+              <a:spcBef>
+                <a:spcPts val="1020"/>
+              </a:spcBef>
+              <a:spcAft>
+                <a:spcPts val="0"/>
+              </a:spcAft>
+              <a:buClr>
+                <a:schemeClr val="lt1"/>
+              </a:buClr>
+              <a:buSzPct val="100000"/>
+              <a:buFont typeface="Merriweather Sans"/>
+              <a:buNone/>
+            </a:pPr>
+            <a:endParaRPr sz="2100" b="0" i="0" u="none" strike="noStrike" cap="none" dirty="0">
+              <a:solidFill>
+                <a:schemeClr val="lt1"/>
+              </a:solidFill>
+              <a:latin typeface="Calibri"/>
+              <a:ea typeface="Calibri"/>
+              <a:cs typeface="Calibri"/>
+              <a:sym typeface="Calibri"/>
+            </a:endParaRPr>
+          </a:p>
+          <a:p>
+            <a:pPr marL="0" marR="0" lvl="0" indent="0" algn="l" rtl="0">
+              <a:spcBef>
+                <a:spcPts val="1080"/>
+              </a:spcBef>
+              <a:spcAft>
+                <a:spcPts val="0"/>
+              </a:spcAft>
+              <a:buClr>
+                <a:schemeClr val="lt1"/>
+              </a:buClr>
+              <a:buSzPct val="25000"/>
+              <a:buFont typeface="Arial"/>
+              <a:buNone/>
+            </a:pPr>
+            <a:endParaRPr sz="2400" b="0" i="0" u="none" strike="noStrike" cap="none" dirty="0">
+              <a:solidFill>
+                <a:schemeClr val="lt1"/>
+              </a:solidFill>
+              <a:latin typeface="Calibri"/>
+              <a:ea typeface="Calibri"/>
+              <a:cs typeface="Calibri"/>
+              <a:sym typeface="Calibri"/>
+            </a:endParaRPr>
+          </a:p>
+          <a:p>
+            <a:pPr marL="0" marR="0" lvl="0" indent="0" algn="l" rtl="0">
+              <a:spcBef>
+                <a:spcPts val="1080"/>
+              </a:spcBef>
+              <a:spcAft>
+                <a:spcPts val="0"/>
+              </a:spcAft>
+              <a:buClr>
+                <a:schemeClr val="lt1"/>
+              </a:buClr>
+              <a:buSzPct val="25000"/>
+              <a:buFont typeface="Arial"/>
+              <a:buNone/>
+            </a:pPr>
+            <a:endParaRPr sz="2400" b="0" i="0" u="none" strike="noStrike" cap="none" dirty="0">
+              <a:solidFill>
+                <a:schemeClr val="lt1"/>
+              </a:solidFill>
+              <a:latin typeface="Calibri"/>
+              <a:ea typeface="Calibri"/>
+              <a:cs typeface="Calibri"/>
+              <a:sym typeface="Calibri"/>
+            </a:endParaRPr>
+          </a:p>
+          <a:p>
+            <a:pPr marL="0" marR="0" lvl="0" indent="0" algn="l" rtl="0">
+              <a:spcBef>
+                <a:spcPts val="1080"/>
+              </a:spcBef>
+              <a:spcAft>
+                <a:spcPts val="0"/>
+              </a:spcAft>
+              <a:buClr>
+                <a:schemeClr val="lt1"/>
+              </a:buClr>
+              <a:buSzPct val="25000"/>
+              <a:buFont typeface="Arial"/>
+              <a:buNone/>
+            </a:pPr>
+            <a:endParaRPr sz="2400" b="0" i="0" u="none" strike="noStrike" cap="none" dirty="0">
+              <a:solidFill>
+                <a:schemeClr val="lt1"/>
+              </a:solidFill>
+              <a:latin typeface="Calibri"/>
+              <a:ea typeface="Calibri"/>
+              <a:cs typeface="Calibri"/>
+              <a:sym typeface="Calibri"/>
+            </a:endParaRPr>
+          </a:p>
+          <a:p>
+            <a:pPr marL="0" marR="0" lvl="0" indent="0" algn="l" rtl="0">
+              <a:spcBef>
+                <a:spcPts val="1080"/>
+              </a:spcBef>
+              <a:spcAft>
+                <a:spcPts val="0"/>
+              </a:spcAft>
+              <a:buClr>
+                <a:schemeClr val="lt1"/>
+              </a:buClr>
+              <a:buSzPct val="25000"/>
+              <a:buFont typeface="Arial"/>
+              <a:buNone/>
+            </a:pPr>
+            <a:endParaRPr sz="2400" b="0" i="0" u="none" strike="noStrike" cap="none" dirty="0">
+              <a:solidFill>
+                <a:schemeClr val="lt1"/>
+              </a:solidFill>
+              <a:latin typeface="Calibri"/>
+              <a:ea typeface="Calibri"/>
+              <a:cs typeface="Calibri"/>
+              <a:sym typeface="Calibri"/>
+            </a:endParaRPr>
+          </a:p>
+        </p:txBody>
+      </p:sp>
+      <p:sp>
+        <p:nvSpPr>
+          <p:cNvPr id="127" name="Shape 127"/>
+          <p:cNvSpPr txBox="1">
+            <a:spLocks noGrp="1"/>
+          </p:cNvSpPr>
+          <p:nvPr>
+            <p:ph type="title"/>
+          </p:nvPr>
+        </p:nvSpPr>
+        <p:spPr>
+          <a:xfrm>
+            <a:off x="0" y="0"/>
+            <a:ext cx="9144000" cy="991351"/>
+          </a:xfrm>
+          <a:prstGeom prst="rect">
+            <a:avLst/>
+          </a:prstGeom>
+          <a:noFill/>
+          <a:ln>
+            <a:noFill/>
+          </a:ln>
+        </p:spPr>
+        <p:txBody>
+          <a:bodyPr lIns="274300" tIns="45700" rIns="91425" bIns="45700" anchor="ctr" anchorCtr="0">
+            <a:noAutofit/>
+          </a:bodyPr>
+          <a:lstStyle/>
+          <a:p>
+            <a:pPr marL="0" marR="0" lvl="0" indent="0" algn="ctr" rtl="0">
+              <a:spcBef>
+                <a:spcPts val="0"/>
+              </a:spcBef>
+              <a:buClr>
+                <a:srgbClr val="EEB211"/>
+              </a:buClr>
+              <a:buSzPct val="25000"/>
+              <a:buFont typeface="Calibri"/>
+              <a:buNone/>
+            </a:pPr>
+            <a:r>
+              <a:rPr lang="en-US" sz="2400" b="0" i="0" u="none" strike="noStrike" cap="none" dirty="0" smtClean="0">
+                <a:solidFill>
+                  <a:srgbClr val="EEB211"/>
+                </a:solidFill>
+                <a:latin typeface="Calibri"/>
+                <a:ea typeface="Calibri"/>
+                <a:cs typeface="Calibri"/>
+                <a:sym typeface="Calibri"/>
+              </a:rPr>
+              <a:t>INTRODUCTION</a:t>
+            </a:r>
+            <a:endParaRPr lang="en-US" sz="2400" b="0" i="0" u="none" strike="noStrike" cap="none" dirty="0">
+              <a:solidFill>
+                <a:srgbClr val="EEB211"/>
+              </a:solidFill>
+              <a:latin typeface="Calibri"/>
+              <a:ea typeface="Calibri"/>
+              <a:cs typeface="Calibri"/>
+              <a:sym typeface="Calibri"/>
+            </a:endParaRPr>
+          </a:p>
+        </p:txBody>
+      </p:sp>
+    </p:spTree>
+    <p:extLst>
+      <p:ext uri="{BB962C8B-B14F-4D97-AF65-F5344CB8AC3E}">
+        <p14:creationId xmlns:p14="http://schemas.microsoft.com/office/powerpoint/2010/main" val="1240815480"/>
+      </p:ext>
+    </p:extLst>
+  </p:cSld>
+  <p:clrMapOvr>
+    <a:masterClrMapping/>
+  </p:clrMapOvr>
+  <p:transition spd="slow">
+    <p:cut/>
+  </p:transition>
+  <p:timing>
+    <p:tnLst>
+      <p:par>
+        <p:cTn id="1" dur="indefinite" restart="never" nodeType="tmRoot"/>
+      </p:par>
+    </p:tnLst>
+  </p:timing>
+</p:sld>
+</file>
+
+<file path=ppt/slides/slide5.xml><?xml version="1.0" encoding="utf-8"?>
 <p:sld xmlns:a="http://schemas.openxmlformats.org/drawingml/2006/main" xmlns:r="http://schemas.openxmlformats.org/officeDocument/2006/relationships" xmlns:p="http://schemas.openxmlformats.org/presentationml/2006/main">
   <p:cSld>
     <p:spTree>
@@ -24361,10 +25286,17 @@
   <p:transition spd="slow">
     <p:cut/>
   </p:transition>
+  <p:timing>
+    <p:tnLst>
+      <p:par>
+        <p:cTn id="1" dur="indefinite" restart="never" nodeType="tmRoot"/>
+      </p:par>
+    </p:tnLst>
+  </p:timing>
 </p:sld>
 </file>
 
-<file path=ppt/slides/slide5.xml><?xml version="1.0" encoding="utf-8"?>
+<file path=ppt/slides/slide6.xml><?xml version="1.0" encoding="utf-8"?>
 <p:sld xmlns:a="http://schemas.openxmlformats.org/drawingml/2006/main" xmlns:r="http://schemas.openxmlformats.org/officeDocument/2006/relationships" xmlns:p="http://schemas.openxmlformats.org/presentationml/2006/main">
   <p:cSld>
     <p:spTree>
@@ -24438,45 +25370,27 @@
             </a:r>
           </a:p>
           <a:p>
-            <a:pPr marL="466344" marR="0" lvl="1" indent="-288544" algn="l" rtl="0">
+            <a:pPr lvl="1" indent="-288544">
               <a:spcBef>
                 <a:spcPts val="1020"/>
               </a:spcBef>
               <a:spcAft>
                 <a:spcPts val="0"/>
               </a:spcAft>
-              <a:buClr>
-                <a:schemeClr val="lt1"/>
-              </a:buClr>
-              <a:buSzPct val="100000"/>
-              <a:buFont typeface="Merriweather Sans"/>
-              <a:buChar char="•"/>
             </a:pPr>
             <a:r>
-              <a:rPr lang="en-US" sz="2100" b="0" i="0" u="none" strike="noStrike" cap="none" dirty="0">
-                <a:solidFill>
-                  <a:schemeClr val="lt1"/>
-                </a:solidFill>
-                <a:latin typeface="Calibri"/>
-                <a:ea typeface="Calibri"/>
-                <a:cs typeface="Calibri"/>
-                <a:sym typeface="Calibri"/>
-              </a:rPr>
-              <a:t>Create a user-friendly web-based interface (</a:t>
+              <a:rPr lang="en-US" dirty="0"/>
+              <a:t>"</a:t>
             </a:r>
             <a:r>
-              <a:rPr lang="en-US" sz="2100" b="0" i="0" u="none" strike="noStrike" cap="none" dirty="0" smtClean="0">
-                <a:solidFill>
-                  <a:schemeClr val="lt1"/>
-                </a:solidFill>
-                <a:latin typeface="Calibri"/>
-                <a:ea typeface="Calibri"/>
-                <a:cs typeface="Calibri"/>
-                <a:sym typeface="Calibri"/>
-              </a:rPr>
-              <a:t>SafeTravels) </a:t>
+              <a:rPr lang="en-US" dirty="0" smtClean="0"/>
+              <a:t>SafeTravels", </a:t>
             </a:r>
-            <a:endParaRPr lang="en-US" sz="2100" b="0" i="0" u="none" strike="noStrike" cap="none" dirty="0">
+            <a:r>
+              <a:rPr lang="en-US" dirty="0"/>
+              <a:t>our proposed web application project, attempts to address the previously raised population health concerns by harnessing the power of health informatics. By integrating with existing data standards like FHIR and outbreak information from organizations like the CDC, we will provide customized recommendations for prospective travelers seeking to ensure a safe and healthy trip. </a:t>
+            </a:r>
+            <a:endParaRPr sz="2400" b="0" i="0" u="none" strike="noStrike" cap="none" dirty="0">
               <a:solidFill>
                 <a:schemeClr val="lt1"/>
               </a:solidFill>
@@ -24485,71 +25399,6 @@
               <a:cs typeface="Calibri"/>
               <a:sym typeface="Calibri"/>
             </a:endParaRPr>
-          </a:p>
-          <a:p>
-            <a:pPr marL="0" marR="0" lvl="0" indent="0" algn="l" rtl="0">
-              <a:spcBef>
-                <a:spcPts val="1080"/>
-              </a:spcBef>
-              <a:spcAft>
-                <a:spcPts val="0"/>
-              </a:spcAft>
-              <a:buClr>
-                <a:schemeClr val="lt1"/>
-              </a:buClr>
-              <a:buSzPct val="25000"/>
-              <a:buFont typeface="Arial"/>
-              <a:buNone/>
-            </a:pPr>
-            <a:endParaRPr sz="2400" b="0" i="0" u="none" strike="noStrike" cap="none" dirty="0">
-              <a:solidFill>
-                <a:schemeClr val="lt1"/>
-              </a:solidFill>
-              <a:latin typeface="Calibri"/>
-              <a:ea typeface="Calibri"/>
-              <a:cs typeface="Calibri"/>
-              <a:sym typeface="Calibri"/>
-            </a:endParaRPr>
-          </a:p>
-          <a:p>
-            <a:pPr marL="0" marR="0" lvl="0" indent="0" algn="l" rtl="0">
-              <a:spcBef>
-                <a:spcPts val="1080"/>
-              </a:spcBef>
-              <a:spcAft>
-                <a:spcPts val="0"/>
-              </a:spcAft>
-              <a:buClr>
-                <a:schemeClr val="lt1"/>
-              </a:buClr>
-              <a:buSzPct val="25000"/>
-              <a:buFont typeface="Arial"/>
-              <a:buNone/>
-            </a:pPr>
-            <a:r>
-              <a:rPr lang="en-US" sz="2400" b="0" i="0" u="none" strike="noStrike" cap="none" dirty="0">
-                <a:solidFill>
-                  <a:schemeClr val="lt1"/>
-                </a:solidFill>
-                <a:latin typeface="Calibri"/>
-                <a:ea typeface="Calibri"/>
-                <a:cs typeface="Calibri"/>
-                <a:sym typeface="Calibri"/>
-              </a:rPr>
-              <a:t>Technical </a:t>
-            </a:r>
-            <a:r>
-              <a:rPr lang="en-US" sz="2400" b="0" i="0" u="none" strike="noStrike" cap="none" dirty="0" smtClean="0">
-                <a:solidFill>
-                  <a:schemeClr val="lt1"/>
-                </a:solidFill>
-                <a:latin typeface="Calibri"/>
-                <a:ea typeface="Calibri"/>
-                <a:cs typeface="Calibri"/>
-                <a:sym typeface="Calibri"/>
-              </a:rPr>
-              <a:t>Details</a:t>
-            </a:r>
           </a:p>
           <a:p>
             <a:pPr marL="0" marR="0" lvl="0" indent="0" algn="l" rtl="0">
@@ -24753,10 +25602,17 @@
   <p:transition spd="slow">
     <p:cut/>
   </p:transition>
+  <p:timing>
+    <p:tnLst>
+      <p:par>
+        <p:cTn id="1" dur="indefinite" restart="never" nodeType="tmRoot"/>
+      </p:par>
+    </p:tnLst>
+  </p:timing>
 </p:sld>
 </file>
 
-<file path=ppt/slides/slide6.xml><?xml version="1.0" encoding="utf-8"?>
+<file path=ppt/slides/slide7.xml><?xml version="1.0" encoding="utf-8"?>
 <p:sld xmlns:a="http://schemas.openxmlformats.org/drawingml/2006/main" xmlns:r="http://schemas.openxmlformats.org/officeDocument/2006/relationships" xmlns:p="http://schemas.openxmlformats.org/presentationml/2006/main">
   <p:cSld>
     <p:spTree>
@@ -25203,10 +26059,17 @@
   <p:transition spd="slow">
     <p:cut/>
   </p:transition>
+  <p:timing>
+    <p:tnLst>
+      <p:par>
+        <p:cTn id="1" dur="indefinite" restart="never" nodeType="tmRoot"/>
+      </p:par>
+    </p:tnLst>
+  </p:timing>
 </p:sld>
 </file>
 
-<file path=ppt/slides/slide7.xml><?xml version="1.0" encoding="utf-8"?>
+<file path=ppt/slides/slide8.xml><?xml version="1.0" encoding="utf-8"?>
 <p:sld xmlns:a="http://schemas.openxmlformats.org/drawingml/2006/main" xmlns:r="http://schemas.openxmlformats.org/officeDocument/2006/relationships" xmlns:p="http://schemas.openxmlformats.org/presentationml/2006/main">
   <p:cSld>
     <p:spTree>
@@ -25539,10 +26402,17 @@
   <p:transition spd="slow">
     <p:cut/>
   </p:transition>
+  <p:timing>
+    <p:tnLst>
+      <p:par>
+        <p:cTn id="1" dur="indefinite" restart="never" nodeType="tmRoot"/>
+      </p:par>
+    </p:tnLst>
+  </p:timing>
 </p:sld>
 </file>
 
-<file path=ppt/slides/slide8.xml><?xml version="1.0" encoding="utf-8"?>
+<file path=ppt/slides/slide9.xml><?xml version="1.0" encoding="utf-8"?>
 <p:sld xmlns:a="http://schemas.openxmlformats.org/drawingml/2006/main" xmlns:r="http://schemas.openxmlformats.org/officeDocument/2006/relationships" xmlns:p="http://schemas.openxmlformats.org/presentationml/2006/main">
   <p:cSld>
     <p:spTree>
@@ -25626,24 +26496,12 @@
               <a:buSzPct val="25000"/>
             </a:pPr>
             <a:r>
-              <a:rPr lang="en-US" dirty="0" smtClean="0"/>
-              <a:t>Need </a:t>
-            </a:r>
-            <a:r>
               <a:rPr lang="en-US" dirty="0"/>
-              <a:t>for a destination </a:t>
+              <a:t>There is a need for a destination based and comprehensive source of information that travelers can turn to in a fast and efficient manner. </a:t>
             </a:r>
             <a:r>
               <a:rPr lang="en-US" dirty="0" smtClean="0"/>
-              <a:t>based, comprehensive </a:t>
-            </a:r>
-            <a:r>
-              <a:rPr lang="en-US" dirty="0"/>
-              <a:t>source of information that travelers can turn to in a fast and efficient </a:t>
-            </a:r>
-            <a:r>
-              <a:rPr lang="en-US" dirty="0" smtClean="0"/>
-              <a:t>manner</a:t>
+              <a:t>– </a:t>
             </a:r>
           </a:p>
           <a:p>
@@ -25656,59 +26514,26 @@
               </a:spcAft>
               <a:buSzPct val="25000"/>
             </a:pPr>
-            <a:r>
-              <a:rPr lang="en-US" dirty="0"/>
-              <a:t>Since travelers might have </a:t>
-            </a:r>
+            <a:endParaRPr lang="en-US" dirty="0"/>
+          </a:p>
+          <a:p>
+            <a:pPr lvl="1">
+              <a:spcBef>
+                <a:spcPts val="1080"/>
+              </a:spcBef>
+              <a:spcAft>
+                <a:spcPts val="0"/>
+              </a:spcAft>
+              <a:buSzPct val="25000"/>
+            </a:pPr>
             <a:r>
               <a:rPr lang="en-US" dirty="0" smtClean="0"/>
-              <a:t>cultural </a:t>
+              <a:t>Since </a:t>
             </a:r>
             <a:r>
               <a:rPr lang="en-US" dirty="0"/>
-              <a:t>or </a:t>
+              <a:t>travelers might have a cultural or a language barrier they should take proactive steps in making sure they are aware of health hazards in their destination</a:t>
             </a:r>
-            <a:r>
-              <a:rPr lang="en-US" dirty="0" smtClean="0"/>
-              <a:t>language barriers </a:t>
-            </a:r>
-            <a:r>
-              <a:rPr lang="en-US" dirty="0"/>
-              <a:t>they should take proactive steps </a:t>
-            </a:r>
-            <a:r>
-              <a:rPr lang="en-US" dirty="0" smtClean="0"/>
-              <a:t>to ensure they </a:t>
-            </a:r>
-            <a:r>
-              <a:rPr lang="en-US" dirty="0"/>
-              <a:t>are aware of health hazards </a:t>
-            </a:r>
-            <a:endParaRPr sz="2400" b="0" i="0" u="none" strike="noStrike" cap="none" dirty="0">
-              <a:solidFill>
-                <a:schemeClr val="lt1"/>
-              </a:solidFill>
-              <a:latin typeface="Calibri"/>
-              <a:ea typeface="Calibri"/>
-              <a:cs typeface="Calibri"/>
-              <a:sym typeface="Calibri"/>
-            </a:endParaRPr>
-          </a:p>
-          <a:p>
-            <a:pPr marL="0" marR="0" lvl="0" indent="0" algn="l" rtl="0">
-              <a:spcBef>
-                <a:spcPts val="1080"/>
-              </a:spcBef>
-              <a:spcAft>
-                <a:spcPts val="0"/>
-              </a:spcAft>
-              <a:buClr>
-                <a:schemeClr val="lt1"/>
-              </a:buClr>
-              <a:buSzPct val="25000"/>
-              <a:buFont typeface="Arial"/>
-              <a:buNone/>
-            </a:pPr>
             <a:endParaRPr sz="2400" b="0" i="0" u="none" strike="noStrike" cap="none" dirty="0">
               <a:solidFill>
                 <a:schemeClr val="lt1"/>
@@ -25910,344 +26735,13 @@
   <p:transition spd="slow">
     <p:cut/>
   </p:transition>
-</p:sld>
-</file>
-
-<file path=ppt/slides/slide9.xml><?xml version="1.0" encoding="utf-8"?>
-<p:sld xmlns:a="http://schemas.openxmlformats.org/drawingml/2006/main" xmlns:r="http://schemas.openxmlformats.org/officeDocument/2006/relationships" xmlns:p="http://schemas.openxmlformats.org/presentationml/2006/main">
-  <p:cSld>
-    <p:spTree>
-      <p:nvGrpSpPr>
-        <p:cNvPr id="1" name="Shape 143"/>
-        <p:cNvGrpSpPr/>
-        <p:nvPr/>
-      </p:nvGrpSpPr>
-      <p:grpSpPr>
-        <a:xfrm>
-          <a:off x="0" y="0"/>
-          <a:ext cx="0" cy="0"/>
-          <a:chOff x="0" y="0"/>
-          <a:chExt cx="0" cy="0"/>
-        </a:xfrm>
-      </p:grpSpPr>
-      <p:sp>
-        <p:nvSpPr>
-          <p:cNvPr id="144" name="Shape 144"/>
-          <p:cNvSpPr txBox="1">
-            <a:spLocks noGrp="1"/>
-          </p:cNvSpPr>
-          <p:nvPr>
-            <p:ph type="body" idx="1"/>
-          </p:nvPr>
-        </p:nvSpPr>
-        <p:spPr>
-          <a:xfrm>
-            <a:off x="0" y="801384"/>
-            <a:ext cx="9143998" cy="5362347"/>
-          </a:xfrm>
-          <a:prstGeom prst="rect">
-            <a:avLst/>
-          </a:prstGeom>
-          <a:noFill/>
-          <a:ln>
-            <a:noFill/>
-          </a:ln>
-        </p:spPr>
-        <p:txBody>
-          <a:bodyPr lIns="274300" tIns="45700" rIns="274300" bIns="45700" anchor="t" anchorCtr="0">
-            <a:noAutofit/>
-          </a:bodyPr>
-          <a:lstStyle/>
-          <a:p>
-            <a:pPr marL="311150" lvl="1" indent="0" algn="ctr">
-              <a:spcBef>
-                <a:spcPts val="1080"/>
-              </a:spcBef>
-              <a:spcAft>
-                <a:spcPts val="0"/>
-              </a:spcAft>
-              <a:buSzPct val="25000"/>
-              <a:buNone/>
-            </a:pPr>
-            <a:r>
-              <a:rPr lang="en-US" sz="1800" dirty="0" smtClean="0"/>
-              <a:t>Survey</a:t>
-            </a:r>
-            <a:r>
-              <a:rPr lang="en-US" sz="1800" dirty="0"/>
-              <a:t>: </a:t>
-            </a:r>
-            <a:r>
-              <a:rPr lang="en-US" sz="1800" dirty="0" smtClean="0"/>
-              <a:t>http</a:t>
-            </a:r>
-            <a:r>
-              <a:rPr lang="en-US" sz="1800" dirty="0"/>
-              <a:t>://goo.gl/forms/LLjb84tBuA </a:t>
-            </a:r>
-            <a:endParaRPr lang="en-US" sz="1800" dirty="0" smtClean="0"/>
-          </a:p>
-          <a:p>
-            <a:pPr marL="311150" lvl="1" indent="0">
-              <a:spcBef>
-                <a:spcPts val="1080"/>
-              </a:spcBef>
-              <a:spcAft>
-                <a:spcPts val="0"/>
-              </a:spcAft>
-              <a:buSzPct val="25000"/>
-              <a:buNone/>
-            </a:pPr>
-            <a:endParaRPr sz="2400" b="0" i="0" u="none" strike="noStrike" cap="none" dirty="0">
-              <a:solidFill>
-                <a:schemeClr val="lt1"/>
-              </a:solidFill>
-              <a:latin typeface="Calibri"/>
-              <a:ea typeface="Calibri"/>
-              <a:cs typeface="Calibri"/>
-              <a:sym typeface="Calibri"/>
-            </a:endParaRPr>
-          </a:p>
-          <a:p>
-            <a:pPr marL="0" marR="0" lvl="0" indent="0" algn="l" rtl="0">
-              <a:spcBef>
-                <a:spcPts val="1080"/>
-              </a:spcBef>
-              <a:spcAft>
-                <a:spcPts val="0"/>
-              </a:spcAft>
-              <a:buClr>
-                <a:schemeClr val="lt1"/>
-              </a:buClr>
-              <a:buSzPct val="25000"/>
-              <a:buFont typeface="Arial"/>
-              <a:buNone/>
-            </a:pPr>
-            <a:endParaRPr sz="2400" b="0" i="0" u="none" strike="noStrike" cap="none" dirty="0">
-              <a:solidFill>
-                <a:schemeClr val="lt1"/>
-              </a:solidFill>
-              <a:latin typeface="Calibri"/>
-              <a:ea typeface="Calibri"/>
-              <a:cs typeface="Calibri"/>
-              <a:sym typeface="Calibri"/>
-            </a:endParaRPr>
-          </a:p>
-          <a:p>
-            <a:pPr marL="0" marR="0" lvl="0" indent="0" algn="l" rtl="0">
-              <a:spcBef>
-                <a:spcPts val="1080"/>
-              </a:spcBef>
-              <a:spcAft>
-                <a:spcPts val="0"/>
-              </a:spcAft>
-              <a:buClr>
-                <a:schemeClr val="lt1"/>
-              </a:buClr>
-              <a:buSzPct val="25000"/>
-              <a:buFont typeface="Arial"/>
-              <a:buNone/>
-            </a:pPr>
-            <a:endParaRPr sz="2400" b="0" i="0" u="none" strike="noStrike" cap="none" dirty="0">
-              <a:solidFill>
-                <a:schemeClr val="lt1"/>
-              </a:solidFill>
-              <a:latin typeface="Calibri"/>
-              <a:ea typeface="Calibri"/>
-              <a:cs typeface="Calibri"/>
-              <a:sym typeface="Calibri"/>
-            </a:endParaRPr>
-          </a:p>
-          <a:p>
-            <a:pPr marL="0" marR="0" lvl="0" indent="0" algn="l" rtl="0">
-              <a:spcBef>
-                <a:spcPts val="1080"/>
-              </a:spcBef>
-              <a:spcAft>
-                <a:spcPts val="0"/>
-              </a:spcAft>
-              <a:buClr>
-                <a:schemeClr val="lt1"/>
-              </a:buClr>
-              <a:buSzPct val="25000"/>
-              <a:buFont typeface="Arial"/>
-              <a:buNone/>
-            </a:pPr>
-            <a:endParaRPr sz="2400" b="0" i="0" u="none" strike="noStrike" cap="none" dirty="0">
-              <a:solidFill>
-                <a:schemeClr val="lt1"/>
-              </a:solidFill>
-              <a:latin typeface="Calibri"/>
-              <a:ea typeface="Calibri"/>
-              <a:cs typeface="Calibri"/>
-              <a:sym typeface="Calibri"/>
-            </a:endParaRPr>
-          </a:p>
-          <a:p>
-            <a:pPr marL="0" marR="0" lvl="0" indent="0" algn="l" rtl="0">
-              <a:spcBef>
-                <a:spcPts val="1080"/>
-              </a:spcBef>
-              <a:spcAft>
-                <a:spcPts val="0"/>
-              </a:spcAft>
-              <a:buClr>
-                <a:schemeClr val="lt1"/>
-              </a:buClr>
-              <a:buSzPct val="25000"/>
-              <a:buFont typeface="Arial"/>
-              <a:buNone/>
-            </a:pPr>
-            <a:endParaRPr sz="2400" b="0" i="0" u="none" strike="noStrike" cap="none" dirty="0">
-              <a:solidFill>
-                <a:schemeClr val="lt1"/>
-              </a:solidFill>
-              <a:latin typeface="Calibri"/>
-              <a:ea typeface="Calibri"/>
-              <a:cs typeface="Calibri"/>
-              <a:sym typeface="Calibri"/>
-            </a:endParaRPr>
-          </a:p>
-          <a:p>
-            <a:pPr marL="0" marR="0" lvl="0" indent="0" algn="l" rtl="0">
-              <a:spcBef>
-                <a:spcPts val="1080"/>
-              </a:spcBef>
-              <a:spcAft>
-                <a:spcPts val="0"/>
-              </a:spcAft>
-              <a:buClr>
-                <a:schemeClr val="lt1"/>
-              </a:buClr>
-              <a:buSzPct val="25000"/>
-              <a:buFont typeface="Arial"/>
-              <a:buNone/>
-            </a:pPr>
-            <a:endParaRPr sz="2400" b="0" i="0" u="none" strike="noStrike" cap="none" dirty="0">
-              <a:solidFill>
-                <a:schemeClr val="lt1"/>
-              </a:solidFill>
-              <a:latin typeface="Calibri"/>
-              <a:ea typeface="Calibri"/>
-              <a:cs typeface="Calibri"/>
-              <a:sym typeface="Calibri"/>
-            </a:endParaRPr>
-          </a:p>
-        </p:txBody>
-      </p:sp>
-      <p:sp>
-        <p:nvSpPr>
-          <p:cNvPr id="145" name="Shape 145"/>
-          <p:cNvSpPr txBox="1">
-            <a:spLocks noGrp="1"/>
-          </p:cNvSpPr>
-          <p:nvPr>
-            <p:ph type="title"/>
-          </p:nvPr>
-        </p:nvSpPr>
-        <p:spPr>
-          <a:xfrm>
-            <a:off x="0" y="0"/>
-            <a:ext cx="9144000" cy="991351"/>
-          </a:xfrm>
-          <a:prstGeom prst="rect">
-            <a:avLst/>
-          </a:prstGeom>
-          <a:noFill/>
-          <a:ln>
-            <a:noFill/>
-          </a:ln>
-        </p:spPr>
-        <p:txBody>
-          <a:bodyPr lIns="274300" tIns="45700" rIns="91425" bIns="45700" anchor="ctr" anchorCtr="0">
-            <a:noAutofit/>
-          </a:bodyPr>
-          <a:lstStyle/>
-          <a:p>
-            <a:pPr marL="0" marR="0" lvl="0" indent="0" algn="ctr" rtl="0">
-              <a:spcBef>
-                <a:spcPts val="0"/>
-              </a:spcBef>
-              <a:buClr>
-                <a:srgbClr val="EEB211"/>
-              </a:buClr>
-              <a:buSzPct val="25000"/>
-              <a:buFont typeface="Calibri"/>
-              <a:buNone/>
-            </a:pPr>
-            <a:r>
-              <a:rPr lang="en-US" sz="2400" b="0" i="0" u="none" strike="noStrike" cap="none" dirty="0">
-                <a:solidFill>
-                  <a:srgbClr val="EEB211"/>
-                </a:solidFill>
-                <a:latin typeface="Calibri"/>
-                <a:ea typeface="Calibri"/>
-                <a:cs typeface="Calibri"/>
-                <a:sym typeface="Calibri"/>
-              </a:rPr>
-              <a:t> </a:t>
-            </a:r>
-            <a:r>
-              <a:rPr lang="en-US" sz="2400" b="0" i="0" u="none" strike="noStrike" cap="none" dirty="0" smtClean="0">
-                <a:solidFill>
-                  <a:srgbClr val="EEB211"/>
-                </a:solidFill>
-                <a:latin typeface="Calibri"/>
-                <a:ea typeface="Calibri"/>
-                <a:cs typeface="Calibri"/>
-                <a:sym typeface="Calibri"/>
-              </a:rPr>
-              <a:t>RESEARCH – SURVEY RESULTS</a:t>
-            </a:r>
-            <a:endParaRPr lang="en-US" sz="2400" b="0" i="0" u="none" strike="noStrike" cap="none" dirty="0">
-              <a:solidFill>
-                <a:srgbClr val="EEB211"/>
-              </a:solidFill>
-              <a:latin typeface="Calibri"/>
-              <a:ea typeface="Calibri"/>
-              <a:cs typeface="Calibri"/>
-              <a:sym typeface="Calibri"/>
-            </a:endParaRPr>
-          </a:p>
-        </p:txBody>
-      </p:sp>
-      <p:pic>
-        <p:nvPicPr>
-          <p:cNvPr id="5" name="Picture 4"/>
-          <p:cNvPicPr>
-            <a:picLocks noChangeAspect="1"/>
-          </p:cNvPicPr>
-          <p:nvPr/>
-        </p:nvPicPr>
-        <p:blipFill>
-          <a:blip r:embed="rId3"/>
-          <a:stretch>
-            <a:fillRect/>
-          </a:stretch>
-        </p:blipFill>
-        <p:spPr>
-          <a:xfrm>
-            <a:off x="1307909" y="1195912"/>
-            <a:ext cx="6471443" cy="5113447"/>
-          </a:xfrm>
-          <a:prstGeom prst="rect">
-            <a:avLst/>
-          </a:prstGeom>
-        </p:spPr>
-      </p:pic>
-    </p:spTree>
-    <p:extLst>
-      <p:ext uri="{BB962C8B-B14F-4D97-AF65-F5344CB8AC3E}">
-        <p14:creationId xmlns:p14="http://schemas.microsoft.com/office/powerpoint/2010/main" val="4016748279"/>
-      </p:ext>
-    </p:extLst>
-  </p:cSld>
-  <p:clrMapOvr>
-    <a:masterClrMapping/>
-  </p:clrMapOvr>
-  <p:transition spd="slow">
-    <p:cut/>
-  </p:transition>
+  <p:timing>
+    <p:tnLst>
+      <p:par>
+        <p:cTn id="1" dur="indefinite" restart="never" nodeType="tmRoot"/>
+      </p:par>
+    </p:tnLst>
+  </p:timing>
 </p:sld>
 </file>
 

</xml_diff>

<commit_message>
Added software architecture slide
</commit_message>
<xml_diff>
--- a/Deliverable1/Docs/TopicPresentation.pptx
+++ b/Deliverable1/Docs/TopicPresentation.pptx
@@ -22703,87 +22703,6 @@
           <a:p>
             <a:pPr marL="0" marR="0" lvl="0" indent="0" algn="l" rtl="0">
               <a:spcBef>
-                <a:spcPts val="0"/>
-              </a:spcBef>
-              <a:spcAft>
-                <a:spcPts val="0"/>
-              </a:spcAft>
-              <a:buClr>
-                <a:schemeClr val="lt1"/>
-              </a:buClr>
-              <a:buSzPct val="25000"/>
-              <a:buFont typeface="Arial"/>
-              <a:buNone/>
-            </a:pPr>
-            <a:r>
-              <a:rPr lang="en-US" sz="2400" b="0" i="0" u="none" strike="noStrike" cap="none" dirty="0">
-                <a:solidFill>
-                  <a:schemeClr val="lt1"/>
-                </a:solidFill>
-                <a:latin typeface="Calibri"/>
-                <a:ea typeface="Calibri"/>
-                <a:cs typeface="Calibri"/>
-                <a:sym typeface="Calibri"/>
-              </a:rPr>
-              <a:t>Tools Required</a:t>
-            </a:r>
-          </a:p>
-          <a:p>
-            <a:pPr marL="0" marR="0" lvl="0" indent="0" algn="l" rtl="0">
-              <a:spcBef>
-                <a:spcPts val="1080"/>
-              </a:spcBef>
-              <a:spcAft>
-                <a:spcPts val="0"/>
-              </a:spcAft>
-              <a:buClr>
-                <a:schemeClr val="lt1"/>
-              </a:buClr>
-              <a:buSzPct val="25000"/>
-              <a:buFont typeface="Arial"/>
-              <a:buNone/>
-            </a:pPr>
-            <a:endParaRPr sz="2400" b="0" i="0" u="none" strike="noStrike" cap="none" dirty="0">
-              <a:solidFill>
-                <a:schemeClr val="lt1"/>
-              </a:solidFill>
-              <a:latin typeface="Calibri"/>
-              <a:ea typeface="Calibri"/>
-              <a:cs typeface="Calibri"/>
-              <a:sym typeface="Calibri"/>
-            </a:endParaRPr>
-          </a:p>
-          <a:p>
-            <a:pPr marL="0" marR="0" lvl="0" indent="0" algn="l" rtl="0">
-              <a:spcBef>
-                <a:spcPts val="1080"/>
-              </a:spcBef>
-              <a:spcAft>
-                <a:spcPts val="0"/>
-              </a:spcAft>
-              <a:buClr>
-                <a:schemeClr val="lt1"/>
-              </a:buClr>
-              <a:buSzPct val="25000"/>
-              <a:buFont typeface="Arial"/>
-              <a:buNone/>
-            </a:pPr>
-            <a:r>
-              <a:rPr lang="en-US" sz="2400" b="0" i="0" u="none" strike="noStrike" cap="none" dirty="0">
-                <a:solidFill>
-                  <a:schemeClr val="lt1"/>
-                </a:solidFill>
-                <a:latin typeface="Calibri"/>
-                <a:ea typeface="Calibri"/>
-                <a:cs typeface="Calibri"/>
-                <a:sym typeface="Calibri"/>
-              </a:rPr>
-              <a:t>External Resources Required</a:t>
-            </a:r>
-          </a:p>
-          <a:p>
-            <a:pPr marL="0" marR="0" lvl="0" indent="0" algn="l" rtl="0">
-              <a:spcBef>
                 <a:spcPts val="1080"/>
               </a:spcBef>
               <a:spcAft>
@@ -22936,7 +22855,7 @@
               <a:t>PROJECT </a:t>
             </a:r>
             <a:r>
-              <a:rPr lang="en-US" sz="2400" b="0" i="0" u="none" strike="noStrike" cap="none" dirty="0">
+              <a:rPr lang="en-US" sz="2400" b="0" i="0" u="none" strike="noStrike" cap="none" dirty="0" smtClean="0">
                 <a:solidFill>
                   <a:srgbClr val="EEB211"/>
                 </a:solidFill>
@@ -22945,11 +22864,50 @@
                 <a:cs typeface="Calibri"/>
                 <a:sym typeface="Calibri"/>
               </a:rPr>
-              <a:t>PLAN</a:t>
+              <a:t>PLAN – SOFTWARE ARCHITECTURE</a:t>
             </a:r>
+            <a:endParaRPr lang="en-US" sz="2400" b="0" i="0" u="none" strike="noStrike" cap="none" dirty="0">
+              <a:solidFill>
+                <a:srgbClr val="EEB211"/>
+              </a:solidFill>
+              <a:latin typeface="Calibri"/>
+              <a:ea typeface="Calibri"/>
+              <a:cs typeface="Calibri"/>
+              <a:sym typeface="Calibri"/>
+            </a:endParaRPr>
           </a:p>
         </p:txBody>
       </p:sp>
+      <p:pic>
+        <p:nvPicPr>
+          <p:cNvPr id="2" name="Picture 1" descr="Software Architecture (2).png"/>
+          <p:cNvPicPr>
+            <a:picLocks noChangeAspect="1"/>
+          </p:cNvPicPr>
+          <p:nvPr/>
+        </p:nvPicPr>
+        <p:blipFill>
+          <a:blip r:embed="rId3">
+            <a:extLst>
+              <a:ext uri="{28A0092B-C50C-407E-A947-70E740481C1C}">
+                <a14:useLocalDpi xmlns:a14="http://schemas.microsoft.com/office/drawing/2010/main" val="0"/>
+              </a:ext>
+            </a:extLst>
+          </a:blip>
+          <a:stretch>
+            <a:fillRect/>
+          </a:stretch>
+        </p:blipFill>
+        <p:spPr>
+          <a:xfrm>
+            <a:off x="241300" y="1104900"/>
+            <a:ext cx="8661400" cy="4635500"/>
+          </a:xfrm>
+          <a:prstGeom prst="rect">
+            <a:avLst/>
+          </a:prstGeom>
+        </p:spPr>
+      </p:pic>
     </p:spTree>
   </p:cSld>
   <p:clrMapOvr>

</xml_diff>